<commit_message>
brain embryo presentation part
</commit_message>
<xml_diff>
--- a/Presentation1.pptx
+++ b/Presentation1.pptx
@@ -12,9 +12,13 @@
     <p:sldId id="260" r:id="rId6"/>
     <p:sldId id="261" r:id="rId7"/>
     <p:sldId id="262" r:id="rId8"/>
-    <p:sldId id="263" r:id="rId9"/>
-    <p:sldId id="264" r:id="rId10"/>
-    <p:sldId id="265" r:id="rId11"/>
+    <p:sldId id="266" r:id="rId9"/>
+    <p:sldId id="267" r:id="rId10"/>
+    <p:sldId id="268" r:id="rId11"/>
+    <p:sldId id="269" r:id="rId12"/>
+    <p:sldId id="270" r:id="rId13"/>
+    <p:sldId id="271" r:id="rId14"/>
+    <p:sldId id="263" r:id="rId15"/>
   </p:sldIdLst>
   <p:sldSz cx="12192000" cy="6858000"/>
   <p:notesSz cx="6858000" cy="9144000"/>
@@ -113,6 +117,11 @@
       </a:defRPr>
     </a:lvl9pPr>
   </p:defaultTextStyle>
+  <p:extLst>
+    <p:ext uri="{EFAFB233-063F-42B5-8137-9DF3F51BA10A}">
+      <p15:sldGuideLst xmlns:p15="http://schemas.microsoft.com/office/powerpoint/2012/main"/>
+    </p:ext>
+  </p:extLst>
 </p:presentation>
 </file>
 
@@ -5841,7 +5850,7 @@
           <p:cNvPr id="2" name="Title 1">
             <a:extLst>
               <a:ext uri="{FF2B5EF4-FFF2-40B4-BE49-F238E27FC236}">
-                <a16:creationId xmlns:a16="http://schemas.microsoft.com/office/drawing/2014/main" id="{0017DCAB-AF68-954F-5BF6-CA4549C8C271}"/>
+                <a16:creationId xmlns:a16="http://schemas.microsoft.com/office/drawing/2014/main" id="{632E37E1-0D61-B775-B353-C4FF65FAE08B}"/>
               </a:ext>
             </a:extLst>
           </p:cNvPr>
@@ -5857,7 +5866,2608 @@
           <a:bodyPr/>
           <a:lstStyle/>
           <a:p>
-            <a:endParaRPr lang="en-RS"/>
+            <a:r>
+              <a:rPr lang="en-RS" dirty="0"/>
+              <a:t>BRAIN EMBRYo</a:t>
+            </a:r>
+          </a:p>
+        </p:txBody>
+      </p:sp>
+      <p:sp>
+        <p:nvSpPr>
+          <p:cNvPr id="5" name="TextBox 4">
+            <a:extLst>
+              <a:ext uri="{FF2B5EF4-FFF2-40B4-BE49-F238E27FC236}">
+                <a16:creationId xmlns:a16="http://schemas.microsoft.com/office/drawing/2014/main" id="{F39CF268-476D-BE8D-181B-C6984F06F12C}"/>
+              </a:ext>
+            </a:extLst>
+          </p:cNvPr>
+          <p:cNvSpPr txBox="1"/>
+          <p:nvPr/>
+        </p:nvSpPr>
+        <p:spPr>
+          <a:xfrm>
+            <a:off x="857627" y="2276468"/>
+            <a:ext cx="3550331" cy="2585323"/>
+          </a:xfrm>
+          <a:prstGeom prst="rect">
+            <a:avLst/>
+          </a:prstGeom>
+          <a:noFill/>
+        </p:spPr>
+        <p:txBody>
+          <a:bodyPr wrap="none" rtlCol="0">
+            <a:spAutoFit/>
+          </a:bodyPr>
+          <a:lstStyle/>
+          <a:p>
+            <a:pPr marL="285750" indent="-285750">
+              <a:buFont typeface="Arial" panose="020B0604020202020204" pitchFamily="34" charset="0"/>
+              <a:buChar char="•"/>
+            </a:pPr>
+            <a:r>
+              <a:rPr lang="en-RS" sz="2400" dirty="0"/>
+              <a:t>PCA</a:t>
+            </a:r>
+            <a:r>
+              <a:rPr lang="en-RS" dirty="0"/>
+              <a:t> </a:t>
+            </a:r>
+            <a:r>
+              <a:rPr lang="en-RS" sz="2400" dirty="0"/>
+              <a:t>FEATURE</a:t>
+            </a:r>
+            <a:r>
+              <a:rPr lang="en-RS" dirty="0"/>
+              <a:t> </a:t>
+            </a:r>
+            <a:r>
+              <a:rPr lang="en-RS" sz="2400" dirty="0"/>
+              <a:t>SELECTION</a:t>
+            </a:r>
+          </a:p>
+          <a:p>
+            <a:pPr marL="285750" indent="-285750">
+              <a:buFont typeface="Arial" panose="020B0604020202020204" pitchFamily="34" charset="0"/>
+              <a:buChar char="•"/>
+            </a:pPr>
+            <a:endParaRPr lang="en-RS" sz="2400" dirty="0"/>
+          </a:p>
+          <a:p>
+            <a:pPr marL="285750" indent="-285750">
+              <a:buFont typeface="Arial" panose="020B0604020202020204" pitchFamily="34" charset="0"/>
+              <a:buChar char="•"/>
+            </a:pPr>
+            <a:r>
+              <a:rPr lang="en-RS" sz="2400" dirty="0"/>
+              <a:t>DATA SHUFFLING</a:t>
+            </a:r>
+          </a:p>
+          <a:p>
+            <a:pPr marL="285750" indent="-285750">
+              <a:buFont typeface="Arial" panose="020B0604020202020204" pitchFamily="34" charset="0"/>
+              <a:buChar char="•"/>
+            </a:pPr>
+            <a:endParaRPr lang="en-RS" sz="2400" dirty="0"/>
+          </a:p>
+          <a:p>
+            <a:pPr marL="285750" indent="-285750">
+              <a:buFont typeface="Arial" panose="020B0604020202020204" pitchFamily="34" charset="0"/>
+              <a:buChar char="•"/>
+            </a:pPr>
+            <a:r>
+              <a:rPr lang="en-RS" sz="2400" dirty="0"/>
+              <a:t>K-FOLD VALIDATION</a:t>
+            </a:r>
+          </a:p>
+          <a:p>
+            <a:pPr marL="285750" indent="-285750">
+              <a:buFont typeface="Arial" panose="020B0604020202020204" pitchFamily="34" charset="0"/>
+              <a:buChar char="•"/>
+            </a:pPr>
+            <a:endParaRPr lang="en-RS" sz="2400" dirty="0"/>
+          </a:p>
+          <a:p>
+            <a:pPr marL="285750" indent="-285750">
+              <a:buFont typeface="Arial" panose="020B0604020202020204" pitchFamily="34" charset="0"/>
+              <a:buChar char="•"/>
+            </a:pPr>
+            <a:endParaRPr lang="en-RS" dirty="0"/>
+          </a:p>
+        </p:txBody>
+      </p:sp>
+      <p:sp>
+        <p:nvSpPr>
+          <p:cNvPr id="9" name="TextBox 8">
+            <a:extLst>
+              <a:ext uri="{FF2B5EF4-FFF2-40B4-BE49-F238E27FC236}">
+                <a16:creationId xmlns:a16="http://schemas.microsoft.com/office/drawing/2014/main" id="{893EA131-D896-7BB6-E3E5-1A2277C0B074}"/>
+              </a:ext>
+            </a:extLst>
+          </p:cNvPr>
+          <p:cNvSpPr txBox="1"/>
+          <p:nvPr/>
+        </p:nvSpPr>
+        <p:spPr>
+          <a:xfrm>
+            <a:off x="857627" y="5072392"/>
+            <a:ext cx="7460515" cy="830997"/>
+          </a:xfrm>
+          <a:prstGeom prst="rect">
+            <a:avLst/>
+          </a:prstGeom>
+          <a:noFill/>
+        </p:spPr>
+        <p:txBody>
+          <a:bodyPr wrap="square">
+            <a:spAutoFit/>
+          </a:bodyPr>
+          <a:lstStyle/>
+          <a:p>
+            <a:r>
+              <a:rPr lang="en-GB" sz="2400" b="0" dirty="0" err="1">
+                <a:solidFill>
+                  <a:srgbClr val="9CDCFE"/>
+                </a:solidFill>
+                <a:effectLst/>
+                <a:latin typeface="Menlo" panose="020B0609030804020204" pitchFamily="49" charset="0"/>
+              </a:rPr>
+              <a:t>K_list</a:t>
+            </a:r>
+            <a:r>
+              <a:rPr lang="en-GB" sz="2400" b="0" dirty="0">
+                <a:solidFill>
+                  <a:srgbClr val="CCCCCC"/>
+                </a:solidFill>
+                <a:effectLst/>
+                <a:latin typeface="Menlo" panose="020B0609030804020204" pitchFamily="49" charset="0"/>
+              </a:rPr>
+              <a:t> </a:t>
+            </a:r>
+            <a:r>
+              <a:rPr lang="en-GB" sz="2400" b="0" dirty="0">
+                <a:solidFill>
+                  <a:srgbClr val="D4D4D4"/>
+                </a:solidFill>
+                <a:effectLst/>
+                <a:latin typeface="Menlo" panose="020B0609030804020204" pitchFamily="49" charset="0"/>
+              </a:rPr>
+              <a:t>=</a:t>
+            </a:r>
+            <a:r>
+              <a:rPr lang="en-GB" sz="2400" b="0" dirty="0">
+                <a:solidFill>
+                  <a:srgbClr val="CCCCCC"/>
+                </a:solidFill>
+                <a:effectLst/>
+                <a:latin typeface="Menlo" panose="020B0609030804020204" pitchFamily="49" charset="0"/>
+              </a:rPr>
+              <a:t> [</a:t>
+            </a:r>
+            <a:r>
+              <a:rPr lang="en-GB" sz="2400" b="0" dirty="0">
+                <a:solidFill>
+                  <a:srgbClr val="B5CEA8"/>
+                </a:solidFill>
+                <a:effectLst/>
+                <a:latin typeface="Menlo" panose="020B0609030804020204" pitchFamily="49" charset="0"/>
+              </a:rPr>
+              <a:t>3</a:t>
+            </a:r>
+            <a:r>
+              <a:rPr lang="en-GB" sz="2400" b="0" dirty="0">
+                <a:solidFill>
+                  <a:srgbClr val="CCCCCC"/>
+                </a:solidFill>
+                <a:effectLst/>
+                <a:latin typeface="Menlo" panose="020B0609030804020204" pitchFamily="49" charset="0"/>
+              </a:rPr>
+              <a:t>, </a:t>
+            </a:r>
+            <a:r>
+              <a:rPr lang="en-GB" sz="2400" b="0" dirty="0">
+                <a:solidFill>
+                  <a:srgbClr val="B5CEA8"/>
+                </a:solidFill>
+                <a:effectLst/>
+                <a:latin typeface="Menlo" panose="020B0609030804020204" pitchFamily="49" charset="0"/>
+              </a:rPr>
+              <a:t>5</a:t>
+            </a:r>
+            <a:r>
+              <a:rPr lang="en-GB" sz="2400" b="0" dirty="0">
+                <a:solidFill>
+                  <a:srgbClr val="CCCCCC"/>
+                </a:solidFill>
+                <a:effectLst/>
+                <a:latin typeface="Menlo" panose="020B0609030804020204" pitchFamily="49" charset="0"/>
+              </a:rPr>
+              <a:t>, </a:t>
+            </a:r>
+            <a:r>
+              <a:rPr lang="en-GB" sz="2400" b="0" dirty="0">
+                <a:solidFill>
+                  <a:srgbClr val="B5CEA8"/>
+                </a:solidFill>
+                <a:effectLst/>
+                <a:latin typeface="Menlo" panose="020B0609030804020204" pitchFamily="49" charset="0"/>
+              </a:rPr>
+              <a:t>7</a:t>
+            </a:r>
+            <a:r>
+              <a:rPr lang="en-GB" sz="2400" b="0" dirty="0">
+                <a:solidFill>
+                  <a:srgbClr val="CCCCCC"/>
+                </a:solidFill>
+                <a:effectLst/>
+                <a:latin typeface="Menlo" panose="020B0609030804020204" pitchFamily="49" charset="0"/>
+              </a:rPr>
+              <a:t>] – classifier count</a:t>
+            </a:r>
+          </a:p>
+          <a:p>
+            <a:r>
+              <a:rPr lang="en-GB" sz="2400" b="0" dirty="0" err="1">
+                <a:solidFill>
+                  <a:srgbClr val="9CDCFE"/>
+                </a:solidFill>
+                <a:effectLst/>
+                <a:latin typeface="Menlo" panose="020B0609030804020204" pitchFamily="49" charset="0"/>
+              </a:rPr>
+              <a:t>L_list</a:t>
+            </a:r>
+            <a:r>
+              <a:rPr lang="en-GB" sz="2400" b="0" dirty="0">
+                <a:solidFill>
+                  <a:srgbClr val="CCCCCC"/>
+                </a:solidFill>
+                <a:effectLst/>
+                <a:latin typeface="Menlo" panose="020B0609030804020204" pitchFamily="49" charset="0"/>
+              </a:rPr>
+              <a:t> </a:t>
+            </a:r>
+            <a:r>
+              <a:rPr lang="en-GB" sz="2400" b="0" dirty="0">
+                <a:solidFill>
+                  <a:srgbClr val="D4D4D4"/>
+                </a:solidFill>
+                <a:effectLst/>
+                <a:latin typeface="Menlo" panose="020B0609030804020204" pitchFamily="49" charset="0"/>
+              </a:rPr>
+              <a:t>=</a:t>
+            </a:r>
+            <a:r>
+              <a:rPr lang="en-GB" sz="2400" b="0" dirty="0">
+                <a:solidFill>
+                  <a:srgbClr val="CCCCCC"/>
+                </a:solidFill>
+                <a:effectLst/>
+                <a:latin typeface="Menlo" panose="020B0609030804020204" pitchFamily="49" charset="0"/>
+              </a:rPr>
+              <a:t> [</a:t>
+            </a:r>
+            <a:r>
+              <a:rPr lang="en-GB" sz="2400" b="0" dirty="0">
+                <a:solidFill>
+                  <a:srgbClr val="B5CEA8"/>
+                </a:solidFill>
+                <a:effectLst/>
+                <a:latin typeface="Menlo" panose="020B0609030804020204" pitchFamily="49" charset="0"/>
+              </a:rPr>
+              <a:t>2</a:t>
+            </a:r>
+            <a:r>
+              <a:rPr lang="en-GB" sz="2400" b="0" dirty="0">
+                <a:solidFill>
+                  <a:srgbClr val="CCCCCC"/>
+                </a:solidFill>
+                <a:effectLst/>
+                <a:latin typeface="Menlo" panose="020B0609030804020204" pitchFamily="49" charset="0"/>
+              </a:rPr>
+              <a:t>, </a:t>
+            </a:r>
+            <a:r>
+              <a:rPr lang="en-GB" sz="2400" b="0" dirty="0">
+                <a:solidFill>
+                  <a:srgbClr val="B5CEA8"/>
+                </a:solidFill>
+                <a:effectLst/>
+                <a:latin typeface="Menlo" panose="020B0609030804020204" pitchFamily="49" charset="0"/>
+              </a:rPr>
+              <a:t>3</a:t>
+            </a:r>
+            <a:r>
+              <a:rPr lang="en-GB" sz="2400" b="0" dirty="0">
+                <a:solidFill>
+                  <a:srgbClr val="CCCCCC"/>
+                </a:solidFill>
+                <a:effectLst/>
+                <a:latin typeface="Menlo" panose="020B0609030804020204" pitchFamily="49" charset="0"/>
+              </a:rPr>
+              <a:t>, </a:t>
+            </a:r>
+            <a:r>
+              <a:rPr lang="en-GB" sz="2400" b="0" dirty="0">
+                <a:solidFill>
+                  <a:srgbClr val="B5CEA8"/>
+                </a:solidFill>
+                <a:effectLst/>
+                <a:latin typeface="Menlo" panose="020B0609030804020204" pitchFamily="49" charset="0"/>
+              </a:rPr>
+              <a:t>4</a:t>
+            </a:r>
+            <a:r>
+              <a:rPr lang="en-GB" sz="2400" b="0" dirty="0">
+                <a:solidFill>
+                  <a:srgbClr val="CCCCCC"/>
+                </a:solidFill>
+                <a:effectLst/>
+                <a:latin typeface="Menlo" panose="020B0609030804020204" pitchFamily="49" charset="0"/>
+              </a:rPr>
+              <a:t>] – majority needed</a:t>
+            </a:r>
+          </a:p>
+        </p:txBody>
+      </p:sp>
+      <p:pic>
+        <p:nvPicPr>
+          <p:cNvPr id="8" name="Picture 7" descr="A graph of the number of points&#10;&#10;Description automatically generated">
+            <a:extLst>
+              <a:ext uri="{FF2B5EF4-FFF2-40B4-BE49-F238E27FC236}">
+                <a16:creationId xmlns:a16="http://schemas.microsoft.com/office/drawing/2014/main" id="{D74E2675-EAE6-38E0-81A3-780666CA4C3E}"/>
+              </a:ext>
+            </a:extLst>
+          </p:cNvPr>
+          <p:cNvPicPr>
+            <a:picLocks noChangeAspect="1"/>
+          </p:cNvPicPr>
+          <p:nvPr/>
+        </p:nvPicPr>
+        <p:blipFill>
+          <a:blip r:embed="rId2"/>
+          <a:stretch>
+            <a:fillRect/>
+          </a:stretch>
+        </p:blipFill>
+        <p:spPr>
+          <a:xfrm>
+            <a:off x="5905688" y="926334"/>
+            <a:ext cx="4911538" cy="3865800"/>
+          </a:xfrm>
+          <a:prstGeom prst="rect">
+            <a:avLst/>
+          </a:prstGeom>
+        </p:spPr>
+      </p:pic>
+    </p:spTree>
+    <p:extLst>
+      <p:ext uri="{BB962C8B-B14F-4D97-AF65-F5344CB8AC3E}">
+        <p14:creationId xmlns:p14="http://schemas.microsoft.com/office/powerpoint/2010/main" val="2408432066"/>
+      </p:ext>
+    </p:extLst>
+  </p:cSld>
+  <p:clrMapOvr>
+    <a:masterClrMapping/>
+  </p:clrMapOvr>
+</p:sld>
+</file>
+
+<file path=ppt/slides/slide11.xml><?xml version="1.0" encoding="utf-8"?>
+<p:sld xmlns:a="http://schemas.openxmlformats.org/drawingml/2006/main" xmlns:r="http://schemas.openxmlformats.org/officeDocument/2006/relationships" xmlns:p="http://schemas.openxmlformats.org/presentationml/2006/main">
+  <p:cSld>
+    <p:spTree>
+      <p:nvGrpSpPr>
+        <p:cNvPr id="1" name=""/>
+        <p:cNvGrpSpPr/>
+        <p:nvPr/>
+      </p:nvGrpSpPr>
+      <p:grpSpPr>
+        <a:xfrm>
+          <a:off x="0" y="0"/>
+          <a:ext cx="0" cy="0"/>
+          <a:chOff x="0" y="0"/>
+          <a:chExt cx="0" cy="0"/>
+        </a:xfrm>
+      </p:grpSpPr>
+      <p:sp>
+        <p:nvSpPr>
+          <p:cNvPr id="2" name="Title 1">
+            <a:extLst>
+              <a:ext uri="{FF2B5EF4-FFF2-40B4-BE49-F238E27FC236}">
+                <a16:creationId xmlns:a16="http://schemas.microsoft.com/office/drawing/2014/main" id="{0571222E-1BBA-530B-F32F-FDF4B6B72D47}"/>
+              </a:ext>
+            </a:extLst>
+          </p:cNvPr>
+          <p:cNvSpPr>
+            <a:spLocks noGrp="1"/>
+          </p:cNvSpPr>
+          <p:nvPr>
+            <p:ph type="title"/>
+          </p:nvPr>
+        </p:nvSpPr>
+        <p:spPr>
+          <a:xfrm>
+            <a:off x="2673785" y="71717"/>
+            <a:ext cx="8325696" cy="1456267"/>
+          </a:xfrm>
+        </p:spPr>
+        <p:txBody>
+          <a:bodyPr/>
+          <a:lstStyle/>
+          <a:p>
+            <a:r>
+              <a:rPr lang="en-RS" dirty="0"/>
+              <a:t>BRAIN EMBRYO</a:t>
+            </a:r>
+          </a:p>
+        </p:txBody>
+      </p:sp>
+      <p:sp>
+        <p:nvSpPr>
+          <p:cNvPr id="4" name="TextBox 3">
+            <a:extLst>
+              <a:ext uri="{FF2B5EF4-FFF2-40B4-BE49-F238E27FC236}">
+                <a16:creationId xmlns:a16="http://schemas.microsoft.com/office/drawing/2014/main" id="{CFFB0425-1E92-C76C-6C55-55275F2F1F98}"/>
+              </a:ext>
+            </a:extLst>
+          </p:cNvPr>
+          <p:cNvSpPr txBox="1"/>
+          <p:nvPr/>
+        </p:nvSpPr>
+        <p:spPr>
+          <a:xfrm>
+            <a:off x="644904" y="1456267"/>
+            <a:ext cx="10902192" cy="5139869"/>
+          </a:xfrm>
+          <a:prstGeom prst="rect">
+            <a:avLst/>
+          </a:prstGeom>
+          <a:noFill/>
+        </p:spPr>
+        <p:txBody>
+          <a:bodyPr wrap="square" rtlCol="0">
+            <a:spAutoFit/>
+          </a:bodyPr>
+          <a:lstStyle/>
+          <a:p>
+            <a:r>
+              <a:rPr lang="en-GB" sz="1600" b="0" dirty="0">
+                <a:solidFill>
+                  <a:srgbClr val="9CDCFE"/>
+                </a:solidFill>
+                <a:effectLst/>
+                <a:latin typeface="Menlo" panose="020B0609030804020204" pitchFamily="49" charset="0"/>
+              </a:rPr>
+              <a:t>classifier1</a:t>
+            </a:r>
+            <a:r>
+              <a:rPr lang="en-GB" sz="1600" b="0" dirty="0">
+                <a:solidFill>
+                  <a:srgbClr val="CCCCCC"/>
+                </a:solidFill>
+                <a:effectLst/>
+                <a:latin typeface="Menlo" panose="020B0609030804020204" pitchFamily="49" charset="0"/>
+              </a:rPr>
+              <a:t> </a:t>
+            </a:r>
+            <a:r>
+              <a:rPr lang="en-GB" sz="1600" b="0" dirty="0">
+                <a:solidFill>
+                  <a:srgbClr val="D4D4D4"/>
+                </a:solidFill>
+                <a:effectLst/>
+                <a:latin typeface="Menlo" panose="020B0609030804020204" pitchFamily="49" charset="0"/>
+              </a:rPr>
+              <a:t>=</a:t>
+            </a:r>
+            <a:r>
+              <a:rPr lang="en-GB" sz="1600" b="0" dirty="0">
+                <a:solidFill>
+                  <a:srgbClr val="CCCCCC"/>
+                </a:solidFill>
+                <a:effectLst/>
+                <a:latin typeface="Menlo" panose="020B0609030804020204" pitchFamily="49" charset="0"/>
+              </a:rPr>
+              <a:t> </a:t>
+            </a:r>
+            <a:r>
+              <a:rPr lang="en-GB" sz="1600" b="0" dirty="0">
+                <a:solidFill>
+                  <a:srgbClr val="4EC9B0"/>
+                </a:solidFill>
+                <a:effectLst/>
+                <a:latin typeface="Menlo" panose="020B0609030804020204" pitchFamily="49" charset="0"/>
+              </a:rPr>
+              <a:t>SVC</a:t>
+            </a:r>
+            <a:r>
+              <a:rPr lang="en-GB" sz="1600" b="0" dirty="0">
+                <a:solidFill>
+                  <a:srgbClr val="CCCCCC"/>
+                </a:solidFill>
+                <a:effectLst/>
+                <a:latin typeface="Menlo" panose="020B0609030804020204" pitchFamily="49" charset="0"/>
+              </a:rPr>
+              <a:t>(</a:t>
+            </a:r>
+            <a:r>
+              <a:rPr lang="en-GB" sz="1600" b="0" dirty="0">
+                <a:solidFill>
+                  <a:srgbClr val="9CDCFE"/>
+                </a:solidFill>
+                <a:effectLst/>
+                <a:latin typeface="Menlo" panose="020B0609030804020204" pitchFamily="49" charset="0"/>
+              </a:rPr>
+              <a:t>kernel</a:t>
+            </a:r>
+            <a:r>
+              <a:rPr lang="en-GB" sz="1600" b="0" dirty="0">
+                <a:solidFill>
+                  <a:srgbClr val="D4D4D4"/>
+                </a:solidFill>
+                <a:effectLst/>
+                <a:latin typeface="Menlo" panose="020B0609030804020204" pitchFamily="49" charset="0"/>
+              </a:rPr>
+              <a:t>=</a:t>
+            </a:r>
+            <a:r>
+              <a:rPr lang="en-GB" sz="1600" b="0" dirty="0">
+                <a:solidFill>
+                  <a:srgbClr val="CE9178"/>
+                </a:solidFill>
+                <a:effectLst/>
+                <a:latin typeface="Menlo" panose="020B0609030804020204" pitchFamily="49" charset="0"/>
+              </a:rPr>
+              <a:t>'</a:t>
+            </a:r>
+            <a:r>
+              <a:rPr lang="en-GB" sz="1600" b="0" dirty="0" err="1">
+                <a:solidFill>
+                  <a:srgbClr val="CE9178"/>
+                </a:solidFill>
+                <a:effectLst/>
+                <a:latin typeface="Menlo" panose="020B0609030804020204" pitchFamily="49" charset="0"/>
+              </a:rPr>
+              <a:t>rbf</a:t>
+            </a:r>
+            <a:r>
+              <a:rPr lang="en-GB" sz="1600" b="0" dirty="0">
+                <a:solidFill>
+                  <a:srgbClr val="CE9178"/>
+                </a:solidFill>
+                <a:effectLst/>
+                <a:latin typeface="Menlo" panose="020B0609030804020204" pitchFamily="49" charset="0"/>
+              </a:rPr>
+              <a:t>'</a:t>
+            </a:r>
+            <a:r>
+              <a:rPr lang="en-GB" sz="1600" b="0" dirty="0">
+                <a:solidFill>
+                  <a:srgbClr val="CCCCCC"/>
+                </a:solidFill>
+                <a:effectLst/>
+                <a:latin typeface="Menlo" panose="020B0609030804020204" pitchFamily="49" charset="0"/>
+              </a:rPr>
+              <a:t>, </a:t>
+            </a:r>
+            <a:r>
+              <a:rPr lang="en-GB" sz="1600" b="0" dirty="0">
+                <a:solidFill>
+                  <a:srgbClr val="9CDCFE"/>
+                </a:solidFill>
+                <a:effectLst/>
+                <a:latin typeface="Menlo" panose="020B0609030804020204" pitchFamily="49" charset="0"/>
+              </a:rPr>
+              <a:t>C</a:t>
+            </a:r>
+            <a:r>
+              <a:rPr lang="en-GB" sz="1600" b="0" dirty="0">
+                <a:solidFill>
+                  <a:srgbClr val="D4D4D4"/>
+                </a:solidFill>
+                <a:effectLst/>
+                <a:latin typeface="Menlo" panose="020B0609030804020204" pitchFamily="49" charset="0"/>
+              </a:rPr>
+              <a:t>=</a:t>
+            </a:r>
+            <a:r>
+              <a:rPr lang="en-GB" sz="1600" b="0" dirty="0">
+                <a:solidFill>
+                  <a:srgbClr val="B5CEA8"/>
+                </a:solidFill>
+                <a:effectLst/>
+                <a:latin typeface="Menlo" panose="020B0609030804020204" pitchFamily="49" charset="0"/>
+              </a:rPr>
+              <a:t>1.0</a:t>
+            </a:r>
+            <a:r>
+              <a:rPr lang="en-GB" sz="1600" b="0" dirty="0">
+                <a:solidFill>
+                  <a:srgbClr val="CCCCCC"/>
+                </a:solidFill>
+                <a:effectLst/>
+                <a:latin typeface="Menlo" panose="020B0609030804020204" pitchFamily="49" charset="0"/>
+              </a:rPr>
+              <a:t>, </a:t>
+            </a:r>
+            <a:r>
+              <a:rPr lang="en-GB" sz="1600" b="0" dirty="0">
+                <a:solidFill>
+                  <a:srgbClr val="9CDCFE"/>
+                </a:solidFill>
+                <a:effectLst/>
+                <a:latin typeface="Menlo" panose="020B0609030804020204" pitchFamily="49" charset="0"/>
+              </a:rPr>
+              <a:t>gamma</a:t>
+            </a:r>
+            <a:r>
+              <a:rPr lang="en-GB" sz="1600" b="0" dirty="0">
+                <a:solidFill>
+                  <a:srgbClr val="D4D4D4"/>
+                </a:solidFill>
+                <a:effectLst/>
+                <a:latin typeface="Menlo" panose="020B0609030804020204" pitchFamily="49" charset="0"/>
+              </a:rPr>
+              <a:t>=</a:t>
+            </a:r>
+            <a:r>
+              <a:rPr lang="en-GB" sz="1600" b="0" dirty="0">
+                <a:solidFill>
+                  <a:srgbClr val="CE9178"/>
+                </a:solidFill>
+                <a:effectLst/>
+                <a:latin typeface="Menlo" panose="020B0609030804020204" pitchFamily="49" charset="0"/>
+              </a:rPr>
+              <a:t>'scale’</a:t>
+            </a:r>
+            <a:r>
+              <a:rPr lang="en-GB" sz="1600" b="0" dirty="0">
+                <a:solidFill>
+                  <a:srgbClr val="CCCCCC"/>
+                </a:solidFill>
+                <a:effectLst/>
+                <a:latin typeface="Menlo" panose="020B0609030804020204" pitchFamily="49" charset="0"/>
+              </a:rPr>
+              <a:t>) </a:t>
+            </a:r>
+          </a:p>
+          <a:p>
+            <a:endParaRPr lang="en-GB" sz="1600" b="0" dirty="0">
+              <a:solidFill>
+                <a:srgbClr val="CCCCCC"/>
+              </a:solidFill>
+              <a:effectLst/>
+              <a:latin typeface="Menlo" panose="020B0609030804020204" pitchFamily="49" charset="0"/>
+            </a:endParaRPr>
+          </a:p>
+          <a:p>
+            <a:r>
+              <a:rPr lang="en-GB" sz="1600" b="0" dirty="0">
+                <a:solidFill>
+                  <a:srgbClr val="9CDCFE"/>
+                </a:solidFill>
+                <a:effectLst/>
+                <a:latin typeface="Menlo" panose="020B0609030804020204" pitchFamily="49" charset="0"/>
+              </a:rPr>
+              <a:t>classifier2</a:t>
+            </a:r>
+            <a:r>
+              <a:rPr lang="en-GB" sz="1600" b="0" dirty="0">
+                <a:solidFill>
+                  <a:srgbClr val="CCCCCC"/>
+                </a:solidFill>
+                <a:effectLst/>
+                <a:latin typeface="Menlo" panose="020B0609030804020204" pitchFamily="49" charset="0"/>
+              </a:rPr>
+              <a:t> </a:t>
+            </a:r>
+            <a:r>
+              <a:rPr lang="en-GB" sz="1600" b="0" dirty="0">
+                <a:solidFill>
+                  <a:srgbClr val="D4D4D4"/>
+                </a:solidFill>
+                <a:effectLst/>
+                <a:latin typeface="Menlo" panose="020B0609030804020204" pitchFamily="49" charset="0"/>
+              </a:rPr>
+              <a:t>=</a:t>
+            </a:r>
+            <a:r>
+              <a:rPr lang="en-GB" sz="1600" b="0" dirty="0">
+                <a:solidFill>
+                  <a:srgbClr val="CCCCCC"/>
+                </a:solidFill>
+                <a:effectLst/>
+                <a:latin typeface="Menlo" panose="020B0609030804020204" pitchFamily="49" charset="0"/>
+              </a:rPr>
+              <a:t> </a:t>
+            </a:r>
+            <a:r>
+              <a:rPr lang="en-GB" sz="1600" b="0" dirty="0" err="1">
+                <a:solidFill>
+                  <a:srgbClr val="4EC9B0"/>
+                </a:solidFill>
+                <a:effectLst/>
+                <a:latin typeface="Menlo" panose="020B0609030804020204" pitchFamily="49" charset="0"/>
+              </a:rPr>
+              <a:t>RandomForestClassifier</a:t>
+            </a:r>
+            <a:r>
+              <a:rPr lang="en-GB" sz="1600" b="0" dirty="0">
+                <a:solidFill>
+                  <a:srgbClr val="CCCCCC"/>
+                </a:solidFill>
+                <a:effectLst/>
+                <a:latin typeface="Menlo" panose="020B0609030804020204" pitchFamily="49" charset="0"/>
+              </a:rPr>
+              <a:t>(</a:t>
+            </a:r>
+            <a:r>
+              <a:rPr lang="en-GB" sz="1600" b="0" dirty="0" err="1">
+                <a:solidFill>
+                  <a:srgbClr val="9CDCFE"/>
+                </a:solidFill>
+                <a:effectLst/>
+                <a:latin typeface="Menlo" panose="020B0609030804020204" pitchFamily="49" charset="0"/>
+              </a:rPr>
+              <a:t>n_estimators</a:t>
+            </a:r>
+            <a:r>
+              <a:rPr lang="en-GB" sz="1600" b="0" dirty="0">
+                <a:solidFill>
+                  <a:srgbClr val="D4D4D4"/>
+                </a:solidFill>
+                <a:effectLst/>
+                <a:latin typeface="Menlo" panose="020B0609030804020204" pitchFamily="49" charset="0"/>
+              </a:rPr>
+              <a:t>=</a:t>
+            </a:r>
+            <a:r>
+              <a:rPr lang="en-GB" sz="1600" b="0" dirty="0">
+                <a:solidFill>
+                  <a:srgbClr val="B5CEA8"/>
+                </a:solidFill>
+                <a:effectLst/>
+                <a:latin typeface="Menlo" panose="020B0609030804020204" pitchFamily="49" charset="0"/>
+              </a:rPr>
+              <a:t>100</a:t>
+            </a:r>
+            <a:r>
+              <a:rPr lang="en-GB" sz="1600" b="0" dirty="0">
+                <a:solidFill>
+                  <a:srgbClr val="CCCCCC"/>
+                </a:solidFill>
+                <a:effectLst/>
+                <a:latin typeface="Menlo" panose="020B0609030804020204" pitchFamily="49" charset="0"/>
+              </a:rPr>
+              <a:t>, </a:t>
+            </a:r>
+            <a:r>
+              <a:rPr lang="en-GB" sz="1600" b="0" dirty="0" err="1">
+                <a:solidFill>
+                  <a:srgbClr val="9CDCFE"/>
+                </a:solidFill>
+                <a:effectLst/>
+                <a:latin typeface="Menlo" panose="020B0609030804020204" pitchFamily="49" charset="0"/>
+              </a:rPr>
+              <a:t>max_depth</a:t>
+            </a:r>
+            <a:r>
+              <a:rPr lang="en-GB" sz="1600" b="0" dirty="0">
+                <a:solidFill>
+                  <a:srgbClr val="D4D4D4"/>
+                </a:solidFill>
+                <a:effectLst/>
+                <a:latin typeface="Menlo" panose="020B0609030804020204" pitchFamily="49" charset="0"/>
+              </a:rPr>
+              <a:t>=</a:t>
+            </a:r>
+            <a:r>
+              <a:rPr lang="en-GB" sz="1600" b="0" dirty="0">
+                <a:solidFill>
+                  <a:srgbClr val="569CD6"/>
+                </a:solidFill>
+                <a:effectLst/>
+                <a:latin typeface="Menlo" panose="020B0609030804020204" pitchFamily="49" charset="0"/>
+              </a:rPr>
+              <a:t>None</a:t>
+            </a:r>
+            <a:r>
+              <a:rPr lang="en-GB" sz="1600" b="0" dirty="0">
+                <a:solidFill>
+                  <a:srgbClr val="CCCCCC"/>
+                </a:solidFill>
+                <a:effectLst/>
+                <a:latin typeface="Menlo" panose="020B0609030804020204" pitchFamily="49" charset="0"/>
+              </a:rPr>
+              <a:t>, </a:t>
+            </a:r>
+            <a:r>
+              <a:rPr lang="en-GB" sz="1600" b="0" dirty="0" err="1">
+                <a:solidFill>
+                  <a:srgbClr val="9CDCFE"/>
+                </a:solidFill>
+                <a:effectLst/>
+                <a:latin typeface="Menlo" panose="020B0609030804020204" pitchFamily="49" charset="0"/>
+              </a:rPr>
+              <a:t>max_features</a:t>
+            </a:r>
+            <a:r>
+              <a:rPr lang="en-GB" sz="1600" b="0" dirty="0">
+                <a:solidFill>
+                  <a:srgbClr val="D4D4D4"/>
+                </a:solidFill>
+                <a:effectLst/>
+                <a:latin typeface="Menlo" panose="020B0609030804020204" pitchFamily="49" charset="0"/>
+              </a:rPr>
+              <a:t>=</a:t>
+            </a:r>
+            <a:r>
+              <a:rPr lang="en-GB" sz="1600" b="0" dirty="0">
+                <a:solidFill>
+                  <a:srgbClr val="CE9178"/>
+                </a:solidFill>
+                <a:effectLst/>
+                <a:latin typeface="Menlo" panose="020B0609030804020204" pitchFamily="49" charset="0"/>
+              </a:rPr>
+              <a:t>"sqrt"</a:t>
+            </a:r>
+            <a:r>
+              <a:rPr lang="en-GB" sz="1600" b="0" dirty="0">
+                <a:solidFill>
+                  <a:srgbClr val="CCCCCC"/>
+                </a:solidFill>
+                <a:effectLst/>
+                <a:latin typeface="Menlo" panose="020B0609030804020204" pitchFamily="49" charset="0"/>
+              </a:rPr>
+              <a:t>)</a:t>
+            </a:r>
+          </a:p>
+          <a:p>
+            <a:endParaRPr lang="en-GB" sz="1600" b="0" dirty="0">
+              <a:solidFill>
+                <a:srgbClr val="CCCCCC"/>
+              </a:solidFill>
+              <a:effectLst/>
+              <a:latin typeface="Menlo" panose="020B0609030804020204" pitchFamily="49" charset="0"/>
+            </a:endParaRPr>
+          </a:p>
+          <a:p>
+            <a:r>
+              <a:rPr lang="en-GB" sz="1600" b="0" dirty="0">
+                <a:solidFill>
+                  <a:srgbClr val="9CDCFE"/>
+                </a:solidFill>
+                <a:effectLst/>
+                <a:latin typeface="Menlo" panose="020B0609030804020204" pitchFamily="49" charset="0"/>
+              </a:rPr>
+              <a:t>classifier3</a:t>
+            </a:r>
+            <a:r>
+              <a:rPr lang="en-GB" sz="1600" b="0" dirty="0">
+                <a:solidFill>
+                  <a:srgbClr val="CCCCCC"/>
+                </a:solidFill>
+                <a:effectLst/>
+                <a:latin typeface="Menlo" panose="020B0609030804020204" pitchFamily="49" charset="0"/>
+              </a:rPr>
+              <a:t> </a:t>
+            </a:r>
+            <a:r>
+              <a:rPr lang="en-GB" sz="1600" b="0" dirty="0">
+                <a:solidFill>
+                  <a:srgbClr val="D4D4D4"/>
+                </a:solidFill>
+                <a:effectLst/>
+                <a:latin typeface="Menlo" panose="020B0609030804020204" pitchFamily="49" charset="0"/>
+              </a:rPr>
+              <a:t>=</a:t>
+            </a:r>
+            <a:r>
+              <a:rPr lang="en-GB" sz="1600" b="0" dirty="0">
+                <a:solidFill>
+                  <a:srgbClr val="CCCCCC"/>
+                </a:solidFill>
+                <a:effectLst/>
+                <a:latin typeface="Menlo" panose="020B0609030804020204" pitchFamily="49" charset="0"/>
+              </a:rPr>
+              <a:t> </a:t>
+            </a:r>
+            <a:r>
+              <a:rPr lang="en-GB" sz="1600" b="0" dirty="0" err="1">
+                <a:solidFill>
+                  <a:srgbClr val="4EC9B0"/>
+                </a:solidFill>
+                <a:effectLst/>
+                <a:latin typeface="Menlo" panose="020B0609030804020204" pitchFamily="49" charset="0"/>
+              </a:rPr>
+              <a:t>RandomForestClassifier</a:t>
+            </a:r>
+            <a:r>
+              <a:rPr lang="en-GB" sz="1600" b="0" dirty="0">
+                <a:solidFill>
+                  <a:srgbClr val="CCCCCC"/>
+                </a:solidFill>
+                <a:effectLst/>
+                <a:latin typeface="Menlo" panose="020B0609030804020204" pitchFamily="49" charset="0"/>
+              </a:rPr>
+              <a:t>(</a:t>
+            </a:r>
+            <a:r>
+              <a:rPr lang="en-GB" sz="1600" b="0" dirty="0" err="1">
+                <a:solidFill>
+                  <a:srgbClr val="9CDCFE"/>
+                </a:solidFill>
+                <a:effectLst/>
+                <a:latin typeface="Menlo" panose="020B0609030804020204" pitchFamily="49" charset="0"/>
+              </a:rPr>
+              <a:t>n_estimators</a:t>
+            </a:r>
+            <a:r>
+              <a:rPr lang="en-GB" sz="1600" b="0" dirty="0">
+                <a:solidFill>
+                  <a:srgbClr val="D4D4D4"/>
+                </a:solidFill>
+                <a:effectLst/>
+                <a:latin typeface="Menlo" panose="020B0609030804020204" pitchFamily="49" charset="0"/>
+              </a:rPr>
+              <a:t>=</a:t>
+            </a:r>
+            <a:r>
+              <a:rPr lang="en-GB" sz="1600" b="0" dirty="0">
+                <a:solidFill>
+                  <a:srgbClr val="B5CEA8"/>
+                </a:solidFill>
+                <a:effectLst/>
+                <a:latin typeface="Menlo" panose="020B0609030804020204" pitchFamily="49" charset="0"/>
+              </a:rPr>
+              <a:t>200</a:t>
+            </a:r>
+            <a:r>
+              <a:rPr lang="en-GB" sz="1600" b="0" dirty="0">
+                <a:solidFill>
+                  <a:srgbClr val="CCCCCC"/>
+                </a:solidFill>
+                <a:effectLst/>
+                <a:latin typeface="Menlo" panose="020B0609030804020204" pitchFamily="49" charset="0"/>
+              </a:rPr>
+              <a:t>, </a:t>
+            </a:r>
+            <a:r>
+              <a:rPr lang="en-GB" sz="1600" b="0" dirty="0" err="1">
+                <a:solidFill>
+                  <a:srgbClr val="9CDCFE"/>
+                </a:solidFill>
+                <a:effectLst/>
+                <a:latin typeface="Menlo" panose="020B0609030804020204" pitchFamily="49" charset="0"/>
+              </a:rPr>
+              <a:t>max_depth</a:t>
+            </a:r>
+            <a:r>
+              <a:rPr lang="en-GB" sz="1600" b="0" dirty="0">
+                <a:solidFill>
+                  <a:srgbClr val="D4D4D4"/>
+                </a:solidFill>
+                <a:effectLst/>
+                <a:latin typeface="Menlo" panose="020B0609030804020204" pitchFamily="49" charset="0"/>
+              </a:rPr>
+              <a:t>=</a:t>
+            </a:r>
+            <a:r>
+              <a:rPr lang="en-GB" sz="1600" b="0" dirty="0">
+                <a:solidFill>
+                  <a:srgbClr val="569CD6"/>
+                </a:solidFill>
+                <a:effectLst/>
+                <a:latin typeface="Menlo" panose="020B0609030804020204" pitchFamily="49" charset="0"/>
+              </a:rPr>
+              <a:t>None</a:t>
+            </a:r>
+            <a:r>
+              <a:rPr lang="en-GB" sz="1600" b="0" dirty="0">
+                <a:solidFill>
+                  <a:srgbClr val="CCCCCC"/>
+                </a:solidFill>
+                <a:effectLst/>
+                <a:latin typeface="Menlo" panose="020B0609030804020204" pitchFamily="49" charset="0"/>
+              </a:rPr>
+              <a:t>, </a:t>
+            </a:r>
+            <a:r>
+              <a:rPr lang="en-GB" sz="1600" b="0" dirty="0" err="1">
+                <a:solidFill>
+                  <a:srgbClr val="9CDCFE"/>
+                </a:solidFill>
+                <a:effectLst/>
+                <a:latin typeface="Menlo" panose="020B0609030804020204" pitchFamily="49" charset="0"/>
+              </a:rPr>
+              <a:t>max_features</a:t>
+            </a:r>
+            <a:r>
+              <a:rPr lang="en-GB" sz="1600" b="0" dirty="0">
+                <a:solidFill>
+                  <a:srgbClr val="D4D4D4"/>
+                </a:solidFill>
+                <a:effectLst/>
+                <a:latin typeface="Menlo" panose="020B0609030804020204" pitchFamily="49" charset="0"/>
+              </a:rPr>
+              <a:t>=</a:t>
+            </a:r>
+            <a:r>
+              <a:rPr lang="en-GB" sz="1600" b="0" dirty="0">
+                <a:solidFill>
+                  <a:srgbClr val="CE9178"/>
+                </a:solidFill>
+                <a:effectLst/>
+                <a:latin typeface="Menlo" panose="020B0609030804020204" pitchFamily="49" charset="0"/>
+              </a:rPr>
+              <a:t>"sqrt"</a:t>
+            </a:r>
+            <a:r>
+              <a:rPr lang="en-GB" sz="1600" b="0" dirty="0">
+                <a:solidFill>
+                  <a:srgbClr val="CCCCCC"/>
+                </a:solidFill>
+                <a:effectLst/>
+                <a:latin typeface="Menlo" panose="020B0609030804020204" pitchFamily="49" charset="0"/>
+              </a:rPr>
+              <a:t>)</a:t>
+            </a:r>
+          </a:p>
+          <a:p>
+            <a:endParaRPr lang="en-GB" sz="1600" b="0" dirty="0">
+              <a:solidFill>
+                <a:srgbClr val="CCCCCC"/>
+              </a:solidFill>
+              <a:effectLst/>
+              <a:latin typeface="Menlo" panose="020B0609030804020204" pitchFamily="49" charset="0"/>
+            </a:endParaRPr>
+          </a:p>
+          <a:p>
+            <a:r>
+              <a:rPr lang="en-GB" sz="1600" b="0" dirty="0">
+                <a:solidFill>
+                  <a:srgbClr val="9CDCFE"/>
+                </a:solidFill>
+                <a:effectLst/>
+                <a:latin typeface="Menlo" panose="020B0609030804020204" pitchFamily="49" charset="0"/>
+              </a:rPr>
+              <a:t>classifier4</a:t>
+            </a:r>
+            <a:r>
+              <a:rPr lang="en-GB" sz="1600" b="0" dirty="0">
+                <a:solidFill>
+                  <a:srgbClr val="CCCCCC"/>
+                </a:solidFill>
+                <a:effectLst/>
+                <a:latin typeface="Menlo" panose="020B0609030804020204" pitchFamily="49" charset="0"/>
+              </a:rPr>
+              <a:t> </a:t>
+            </a:r>
+            <a:r>
+              <a:rPr lang="en-GB" sz="1600" b="0" dirty="0">
+                <a:solidFill>
+                  <a:srgbClr val="D4D4D4"/>
+                </a:solidFill>
+                <a:effectLst/>
+                <a:latin typeface="Menlo" panose="020B0609030804020204" pitchFamily="49" charset="0"/>
+              </a:rPr>
+              <a:t>=</a:t>
+            </a:r>
+            <a:r>
+              <a:rPr lang="en-GB" sz="1600" b="0" dirty="0">
+                <a:solidFill>
+                  <a:srgbClr val="CCCCCC"/>
+                </a:solidFill>
+                <a:effectLst/>
+                <a:latin typeface="Menlo" panose="020B0609030804020204" pitchFamily="49" charset="0"/>
+              </a:rPr>
+              <a:t> </a:t>
+            </a:r>
+            <a:r>
+              <a:rPr lang="en-GB" sz="1600" b="0" dirty="0" err="1">
+                <a:solidFill>
+                  <a:srgbClr val="4EC9B0"/>
+                </a:solidFill>
+                <a:effectLst/>
+                <a:latin typeface="Menlo" panose="020B0609030804020204" pitchFamily="49" charset="0"/>
+              </a:rPr>
+              <a:t>RandomForestClassifier</a:t>
+            </a:r>
+            <a:r>
+              <a:rPr lang="en-GB" sz="1600" b="0" dirty="0">
+                <a:solidFill>
+                  <a:srgbClr val="CCCCCC"/>
+                </a:solidFill>
+                <a:effectLst/>
+                <a:latin typeface="Menlo" panose="020B0609030804020204" pitchFamily="49" charset="0"/>
+              </a:rPr>
+              <a:t>(</a:t>
+            </a:r>
+            <a:r>
+              <a:rPr lang="en-GB" sz="1600" b="0" dirty="0" err="1">
+                <a:solidFill>
+                  <a:srgbClr val="9CDCFE"/>
+                </a:solidFill>
+                <a:effectLst/>
+                <a:latin typeface="Menlo" panose="020B0609030804020204" pitchFamily="49" charset="0"/>
+              </a:rPr>
+              <a:t>n_estimators</a:t>
+            </a:r>
+            <a:r>
+              <a:rPr lang="en-GB" sz="1600" b="0" dirty="0">
+                <a:solidFill>
+                  <a:srgbClr val="D4D4D4"/>
+                </a:solidFill>
+                <a:effectLst/>
+                <a:latin typeface="Menlo" panose="020B0609030804020204" pitchFamily="49" charset="0"/>
+              </a:rPr>
+              <a:t>=</a:t>
+            </a:r>
+            <a:r>
+              <a:rPr lang="en-GB" sz="1600" b="0" dirty="0">
+                <a:solidFill>
+                  <a:srgbClr val="B5CEA8"/>
+                </a:solidFill>
+                <a:effectLst/>
+                <a:latin typeface="Menlo" panose="020B0609030804020204" pitchFamily="49" charset="0"/>
+              </a:rPr>
+              <a:t>100</a:t>
+            </a:r>
+            <a:r>
+              <a:rPr lang="en-GB" sz="1600" b="0" dirty="0">
+                <a:solidFill>
+                  <a:srgbClr val="CCCCCC"/>
+                </a:solidFill>
+                <a:effectLst/>
+                <a:latin typeface="Menlo" panose="020B0609030804020204" pitchFamily="49" charset="0"/>
+              </a:rPr>
+              <a:t>, </a:t>
+            </a:r>
+            <a:r>
+              <a:rPr lang="en-GB" sz="1600" b="0" dirty="0" err="1">
+                <a:solidFill>
+                  <a:srgbClr val="9CDCFE"/>
+                </a:solidFill>
+                <a:effectLst/>
+                <a:latin typeface="Menlo" panose="020B0609030804020204" pitchFamily="49" charset="0"/>
+              </a:rPr>
+              <a:t>max_depth</a:t>
+            </a:r>
+            <a:r>
+              <a:rPr lang="en-GB" sz="1600" b="0" dirty="0">
+                <a:solidFill>
+                  <a:srgbClr val="D4D4D4"/>
+                </a:solidFill>
+                <a:effectLst/>
+                <a:latin typeface="Menlo" panose="020B0609030804020204" pitchFamily="49" charset="0"/>
+              </a:rPr>
+              <a:t>=</a:t>
+            </a:r>
+            <a:r>
+              <a:rPr lang="en-GB" sz="1600" b="0" dirty="0">
+                <a:solidFill>
+                  <a:srgbClr val="B5CEA8"/>
+                </a:solidFill>
+                <a:effectLst/>
+                <a:latin typeface="Menlo" panose="020B0609030804020204" pitchFamily="49" charset="0"/>
+              </a:rPr>
+              <a:t>10</a:t>
+            </a:r>
+            <a:r>
+              <a:rPr lang="en-GB" sz="1600" b="0" dirty="0">
+                <a:solidFill>
+                  <a:srgbClr val="CCCCCC"/>
+                </a:solidFill>
+                <a:effectLst/>
+                <a:latin typeface="Menlo" panose="020B0609030804020204" pitchFamily="49" charset="0"/>
+              </a:rPr>
+              <a:t>, </a:t>
+            </a:r>
+            <a:r>
+              <a:rPr lang="en-GB" sz="1600" b="0" dirty="0" err="1">
+                <a:solidFill>
+                  <a:srgbClr val="9CDCFE"/>
+                </a:solidFill>
+                <a:effectLst/>
+                <a:latin typeface="Menlo" panose="020B0609030804020204" pitchFamily="49" charset="0"/>
+              </a:rPr>
+              <a:t>max_features</a:t>
+            </a:r>
+            <a:r>
+              <a:rPr lang="en-GB" sz="1600" b="0" dirty="0">
+                <a:solidFill>
+                  <a:srgbClr val="D4D4D4"/>
+                </a:solidFill>
+                <a:effectLst/>
+                <a:latin typeface="Menlo" panose="020B0609030804020204" pitchFamily="49" charset="0"/>
+              </a:rPr>
+              <a:t>=</a:t>
+            </a:r>
+            <a:r>
+              <a:rPr lang="en-GB" sz="1600" b="0" dirty="0">
+                <a:solidFill>
+                  <a:srgbClr val="CE9178"/>
+                </a:solidFill>
+                <a:effectLst/>
+                <a:latin typeface="Menlo" panose="020B0609030804020204" pitchFamily="49" charset="0"/>
+              </a:rPr>
+              <a:t>"sqrt"</a:t>
+            </a:r>
+            <a:r>
+              <a:rPr lang="en-GB" sz="1600" b="0" dirty="0">
+                <a:solidFill>
+                  <a:srgbClr val="CCCCCC"/>
+                </a:solidFill>
+                <a:effectLst/>
+                <a:latin typeface="Menlo" panose="020B0609030804020204" pitchFamily="49" charset="0"/>
+              </a:rPr>
+              <a:t>)</a:t>
+            </a:r>
+          </a:p>
+          <a:p>
+            <a:endParaRPr lang="en-GB" sz="1600" b="0" dirty="0">
+              <a:solidFill>
+                <a:srgbClr val="CCCCCC"/>
+              </a:solidFill>
+              <a:effectLst/>
+              <a:latin typeface="Menlo" panose="020B0609030804020204" pitchFamily="49" charset="0"/>
+            </a:endParaRPr>
+          </a:p>
+          <a:p>
+            <a:r>
+              <a:rPr lang="en-GB" sz="1600" b="0" dirty="0">
+                <a:solidFill>
+                  <a:srgbClr val="9CDCFE"/>
+                </a:solidFill>
+                <a:effectLst/>
+                <a:latin typeface="Menlo" panose="020B0609030804020204" pitchFamily="49" charset="0"/>
+              </a:rPr>
+              <a:t>classifier5</a:t>
+            </a:r>
+            <a:r>
+              <a:rPr lang="en-GB" sz="1600" b="0" dirty="0">
+                <a:solidFill>
+                  <a:srgbClr val="CCCCCC"/>
+                </a:solidFill>
+                <a:effectLst/>
+                <a:latin typeface="Menlo" panose="020B0609030804020204" pitchFamily="49" charset="0"/>
+              </a:rPr>
+              <a:t> </a:t>
+            </a:r>
+            <a:r>
+              <a:rPr lang="en-GB" sz="1600" b="0" dirty="0">
+                <a:solidFill>
+                  <a:srgbClr val="D4D4D4"/>
+                </a:solidFill>
+                <a:effectLst/>
+                <a:latin typeface="Menlo" panose="020B0609030804020204" pitchFamily="49" charset="0"/>
+              </a:rPr>
+              <a:t>=</a:t>
+            </a:r>
+            <a:r>
+              <a:rPr lang="en-GB" sz="1600" b="0" dirty="0">
+                <a:solidFill>
+                  <a:srgbClr val="CCCCCC"/>
+                </a:solidFill>
+                <a:effectLst/>
+                <a:latin typeface="Menlo" panose="020B0609030804020204" pitchFamily="49" charset="0"/>
+              </a:rPr>
+              <a:t> </a:t>
+            </a:r>
+            <a:r>
+              <a:rPr lang="en-GB" sz="1600" b="0" dirty="0" err="1">
+                <a:solidFill>
+                  <a:srgbClr val="4EC9B0"/>
+                </a:solidFill>
+                <a:effectLst/>
+                <a:latin typeface="Menlo" panose="020B0609030804020204" pitchFamily="49" charset="0"/>
+              </a:rPr>
+              <a:t>RandomForestClassifier</a:t>
+            </a:r>
+            <a:r>
+              <a:rPr lang="en-GB" sz="1600" b="0" dirty="0">
+                <a:solidFill>
+                  <a:srgbClr val="CCCCCC"/>
+                </a:solidFill>
+                <a:effectLst/>
+                <a:latin typeface="Menlo" panose="020B0609030804020204" pitchFamily="49" charset="0"/>
+              </a:rPr>
+              <a:t>(</a:t>
+            </a:r>
+            <a:r>
+              <a:rPr lang="en-GB" sz="1600" b="0" dirty="0" err="1">
+                <a:solidFill>
+                  <a:srgbClr val="9CDCFE"/>
+                </a:solidFill>
+                <a:effectLst/>
+                <a:latin typeface="Menlo" panose="020B0609030804020204" pitchFamily="49" charset="0"/>
+              </a:rPr>
+              <a:t>n_estimators</a:t>
+            </a:r>
+            <a:r>
+              <a:rPr lang="en-GB" sz="1600" b="0" dirty="0">
+                <a:solidFill>
+                  <a:srgbClr val="D4D4D4"/>
+                </a:solidFill>
+                <a:effectLst/>
+                <a:latin typeface="Menlo" panose="020B0609030804020204" pitchFamily="49" charset="0"/>
+              </a:rPr>
+              <a:t>=</a:t>
+            </a:r>
+            <a:r>
+              <a:rPr lang="en-GB" sz="1600" b="0" dirty="0">
+                <a:solidFill>
+                  <a:srgbClr val="B5CEA8"/>
+                </a:solidFill>
+                <a:effectLst/>
+                <a:latin typeface="Menlo" panose="020B0609030804020204" pitchFamily="49" charset="0"/>
+              </a:rPr>
+              <a:t>200</a:t>
+            </a:r>
+            <a:r>
+              <a:rPr lang="en-GB" sz="1600" b="0" dirty="0">
+                <a:solidFill>
+                  <a:srgbClr val="CCCCCC"/>
+                </a:solidFill>
+                <a:effectLst/>
+                <a:latin typeface="Menlo" panose="020B0609030804020204" pitchFamily="49" charset="0"/>
+              </a:rPr>
+              <a:t>, </a:t>
+            </a:r>
+            <a:r>
+              <a:rPr lang="en-GB" sz="1600" b="0" dirty="0" err="1">
+                <a:solidFill>
+                  <a:srgbClr val="9CDCFE"/>
+                </a:solidFill>
+                <a:effectLst/>
+                <a:latin typeface="Menlo" panose="020B0609030804020204" pitchFamily="49" charset="0"/>
+              </a:rPr>
+              <a:t>max_depth</a:t>
+            </a:r>
+            <a:r>
+              <a:rPr lang="en-GB" sz="1600" b="0" dirty="0">
+                <a:solidFill>
+                  <a:srgbClr val="D4D4D4"/>
+                </a:solidFill>
+                <a:effectLst/>
+                <a:latin typeface="Menlo" panose="020B0609030804020204" pitchFamily="49" charset="0"/>
+              </a:rPr>
+              <a:t>=</a:t>
+            </a:r>
+            <a:r>
+              <a:rPr lang="en-GB" sz="1600" b="0" dirty="0">
+                <a:solidFill>
+                  <a:srgbClr val="569CD6"/>
+                </a:solidFill>
+                <a:effectLst/>
+                <a:latin typeface="Menlo" panose="020B0609030804020204" pitchFamily="49" charset="0"/>
+              </a:rPr>
+              <a:t>None</a:t>
+            </a:r>
+            <a:r>
+              <a:rPr lang="en-GB" sz="1600" b="0" dirty="0">
+                <a:solidFill>
+                  <a:srgbClr val="CCCCCC"/>
+                </a:solidFill>
+                <a:effectLst/>
+                <a:latin typeface="Menlo" panose="020B0609030804020204" pitchFamily="49" charset="0"/>
+              </a:rPr>
+              <a:t>, </a:t>
+            </a:r>
+            <a:r>
+              <a:rPr lang="en-GB" sz="1600" b="0" dirty="0" err="1">
+                <a:solidFill>
+                  <a:srgbClr val="9CDCFE"/>
+                </a:solidFill>
+                <a:effectLst/>
+                <a:latin typeface="Menlo" panose="020B0609030804020204" pitchFamily="49" charset="0"/>
+              </a:rPr>
+              <a:t>max_features</a:t>
+            </a:r>
+            <a:r>
+              <a:rPr lang="en-GB" sz="1600" b="0" dirty="0">
+                <a:solidFill>
+                  <a:srgbClr val="D4D4D4"/>
+                </a:solidFill>
+                <a:effectLst/>
+                <a:latin typeface="Menlo" panose="020B0609030804020204" pitchFamily="49" charset="0"/>
+              </a:rPr>
+              <a:t>=</a:t>
+            </a:r>
+            <a:r>
+              <a:rPr lang="en-GB" sz="1600" b="0" dirty="0">
+                <a:solidFill>
+                  <a:srgbClr val="CE9178"/>
+                </a:solidFill>
+                <a:effectLst/>
+                <a:latin typeface="Menlo" panose="020B0609030804020204" pitchFamily="49" charset="0"/>
+              </a:rPr>
+              <a:t>"log2"</a:t>
+            </a:r>
+            <a:r>
+              <a:rPr lang="en-GB" sz="1600" b="0" dirty="0">
+                <a:solidFill>
+                  <a:srgbClr val="CCCCCC"/>
+                </a:solidFill>
+                <a:effectLst/>
+                <a:latin typeface="Menlo" panose="020B0609030804020204" pitchFamily="49" charset="0"/>
+              </a:rPr>
+              <a:t>)</a:t>
+            </a:r>
+          </a:p>
+          <a:p>
+            <a:endParaRPr lang="en-GB" sz="1600" b="0" dirty="0">
+              <a:solidFill>
+                <a:srgbClr val="CCCCCC"/>
+              </a:solidFill>
+              <a:effectLst/>
+              <a:latin typeface="Menlo" panose="020B0609030804020204" pitchFamily="49" charset="0"/>
+            </a:endParaRPr>
+          </a:p>
+          <a:p>
+            <a:r>
+              <a:rPr lang="en-GB" sz="1600" b="0" dirty="0">
+                <a:solidFill>
+                  <a:srgbClr val="9CDCFE"/>
+                </a:solidFill>
+                <a:effectLst/>
+                <a:latin typeface="Menlo" panose="020B0609030804020204" pitchFamily="49" charset="0"/>
+              </a:rPr>
+              <a:t>classifier6</a:t>
+            </a:r>
+            <a:r>
+              <a:rPr lang="en-GB" sz="1600" b="0" dirty="0">
+                <a:solidFill>
+                  <a:srgbClr val="CCCCCC"/>
+                </a:solidFill>
+                <a:effectLst/>
+                <a:latin typeface="Menlo" panose="020B0609030804020204" pitchFamily="49" charset="0"/>
+              </a:rPr>
+              <a:t> </a:t>
+            </a:r>
+            <a:r>
+              <a:rPr lang="en-GB" sz="1600" b="0" dirty="0">
+                <a:solidFill>
+                  <a:srgbClr val="D4D4D4"/>
+                </a:solidFill>
+                <a:effectLst/>
+                <a:latin typeface="Menlo" panose="020B0609030804020204" pitchFamily="49" charset="0"/>
+              </a:rPr>
+              <a:t>=</a:t>
+            </a:r>
+            <a:r>
+              <a:rPr lang="en-GB" sz="1600" b="0" dirty="0">
+                <a:solidFill>
+                  <a:srgbClr val="CCCCCC"/>
+                </a:solidFill>
+                <a:effectLst/>
+                <a:latin typeface="Menlo" panose="020B0609030804020204" pitchFamily="49" charset="0"/>
+              </a:rPr>
+              <a:t> </a:t>
+            </a:r>
+            <a:r>
+              <a:rPr lang="en-GB" sz="1600" b="0" dirty="0" err="1">
+                <a:solidFill>
+                  <a:srgbClr val="4EC9B0"/>
+                </a:solidFill>
+                <a:effectLst/>
+                <a:latin typeface="Menlo" panose="020B0609030804020204" pitchFamily="49" charset="0"/>
+              </a:rPr>
+              <a:t>RandomForestClassifier</a:t>
+            </a:r>
+            <a:r>
+              <a:rPr lang="en-GB" sz="1600" b="0" dirty="0">
+                <a:solidFill>
+                  <a:srgbClr val="CCCCCC"/>
+                </a:solidFill>
+                <a:effectLst/>
+                <a:latin typeface="Menlo" panose="020B0609030804020204" pitchFamily="49" charset="0"/>
+              </a:rPr>
+              <a:t>(</a:t>
+            </a:r>
+            <a:r>
+              <a:rPr lang="en-GB" sz="1600" b="0" dirty="0" err="1">
+                <a:solidFill>
+                  <a:srgbClr val="9CDCFE"/>
+                </a:solidFill>
+                <a:effectLst/>
+                <a:latin typeface="Menlo" panose="020B0609030804020204" pitchFamily="49" charset="0"/>
+              </a:rPr>
+              <a:t>n_estimators</a:t>
+            </a:r>
+            <a:r>
+              <a:rPr lang="en-GB" sz="1600" b="0" dirty="0">
+                <a:solidFill>
+                  <a:srgbClr val="D4D4D4"/>
+                </a:solidFill>
+                <a:effectLst/>
+                <a:latin typeface="Menlo" panose="020B0609030804020204" pitchFamily="49" charset="0"/>
+              </a:rPr>
+              <a:t>=</a:t>
+            </a:r>
+            <a:r>
+              <a:rPr lang="en-GB" sz="1600" b="0" dirty="0">
+                <a:solidFill>
+                  <a:srgbClr val="B5CEA8"/>
+                </a:solidFill>
+                <a:effectLst/>
+                <a:latin typeface="Menlo" panose="020B0609030804020204" pitchFamily="49" charset="0"/>
+              </a:rPr>
+              <a:t>100</a:t>
+            </a:r>
+            <a:r>
+              <a:rPr lang="en-GB" sz="1600" b="0" dirty="0">
+                <a:solidFill>
+                  <a:srgbClr val="CCCCCC"/>
+                </a:solidFill>
+                <a:effectLst/>
+                <a:latin typeface="Menlo" panose="020B0609030804020204" pitchFamily="49" charset="0"/>
+              </a:rPr>
+              <a:t>, </a:t>
+            </a:r>
+            <a:r>
+              <a:rPr lang="en-GB" sz="1600" b="0" dirty="0" err="1">
+                <a:solidFill>
+                  <a:srgbClr val="9CDCFE"/>
+                </a:solidFill>
+                <a:effectLst/>
+                <a:latin typeface="Menlo" panose="020B0609030804020204" pitchFamily="49" charset="0"/>
+              </a:rPr>
+              <a:t>max_depth</a:t>
+            </a:r>
+            <a:r>
+              <a:rPr lang="en-GB" sz="1600" b="0" dirty="0">
+                <a:solidFill>
+                  <a:srgbClr val="D4D4D4"/>
+                </a:solidFill>
+                <a:effectLst/>
+                <a:latin typeface="Menlo" panose="020B0609030804020204" pitchFamily="49" charset="0"/>
+              </a:rPr>
+              <a:t>=</a:t>
+            </a:r>
+            <a:r>
+              <a:rPr lang="en-GB" sz="1600" b="0" dirty="0">
+                <a:solidFill>
+                  <a:srgbClr val="569CD6"/>
+                </a:solidFill>
+                <a:effectLst/>
+                <a:latin typeface="Menlo" panose="020B0609030804020204" pitchFamily="49" charset="0"/>
+              </a:rPr>
+              <a:t>None</a:t>
+            </a:r>
+            <a:r>
+              <a:rPr lang="en-GB" sz="1600" b="0" dirty="0">
+                <a:solidFill>
+                  <a:srgbClr val="CCCCCC"/>
+                </a:solidFill>
+                <a:effectLst/>
+                <a:latin typeface="Menlo" panose="020B0609030804020204" pitchFamily="49" charset="0"/>
+              </a:rPr>
+              <a:t>, </a:t>
+            </a:r>
+            <a:r>
+              <a:rPr lang="en-GB" sz="1600" b="0" dirty="0" err="1">
+                <a:solidFill>
+                  <a:srgbClr val="9CDCFE"/>
+                </a:solidFill>
+                <a:effectLst/>
+                <a:latin typeface="Menlo" panose="020B0609030804020204" pitchFamily="49" charset="0"/>
+              </a:rPr>
+              <a:t>max_features</a:t>
+            </a:r>
+            <a:r>
+              <a:rPr lang="en-GB" sz="1600" b="0" dirty="0">
+                <a:solidFill>
+                  <a:srgbClr val="D4D4D4"/>
+                </a:solidFill>
+                <a:effectLst/>
+                <a:latin typeface="Menlo" panose="020B0609030804020204" pitchFamily="49" charset="0"/>
+              </a:rPr>
+              <a:t>=</a:t>
+            </a:r>
+            <a:r>
+              <a:rPr lang="en-GB" sz="1600" b="0" dirty="0">
+                <a:solidFill>
+                  <a:srgbClr val="CE9178"/>
+                </a:solidFill>
+                <a:effectLst/>
+                <a:latin typeface="Menlo" panose="020B0609030804020204" pitchFamily="49" charset="0"/>
+              </a:rPr>
+              <a:t>"log2"</a:t>
+            </a:r>
+            <a:r>
+              <a:rPr lang="en-GB" sz="1600" b="0" dirty="0">
+                <a:solidFill>
+                  <a:srgbClr val="CCCCCC"/>
+                </a:solidFill>
+                <a:effectLst/>
+                <a:latin typeface="Menlo" panose="020B0609030804020204" pitchFamily="49" charset="0"/>
+              </a:rPr>
+              <a:t>)</a:t>
+            </a:r>
+          </a:p>
+          <a:p>
+            <a:endParaRPr lang="en-GB" sz="1600" b="0" dirty="0">
+              <a:solidFill>
+                <a:srgbClr val="CCCCCC"/>
+              </a:solidFill>
+              <a:effectLst/>
+              <a:latin typeface="Menlo" panose="020B0609030804020204" pitchFamily="49" charset="0"/>
+            </a:endParaRPr>
+          </a:p>
+          <a:p>
+            <a:r>
+              <a:rPr lang="en-GB" sz="1600" b="0" dirty="0">
+                <a:solidFill>
+                  <a:srgbClr val="9CDCFE"/>
+                </a:solidFill>
+                <a:effectLst/>
+                <a:latin typeface="Menlo" panose="020B0609030804020204" pitchFamily="49" charset="0"/>
+              </a:rPr>
+              <a:t>classifier7</a:t>
+            </a:r>
+            <a:r>
+              <a:rPr lang="en-GB" sz="1600" b="0" dirty="0">
+                <a:solidFill>
+                  <a:srgbClr val="CCCCCC"/>
+                </a:solidFill>
+                <a:effectLst/>
+                <a:latin typeface="Menlo" panose="020B0609030804020204" pitchFamily="49" charset="0"/>
+              </a:rPr>
+              <a:t> </a:t>
+            </a:r>
+            <a:r>
+              <a:rPr lang="en-GB" sz="1600" b="0" dirty="0">
+                <a:solidFill>
+                  <a:srgbClr val="D4D4D4"/>
+                </a:solidFill>
+                <a:effectLst/>
+                <a:latin typeface="Menlo" panose="020B0609030804020204" pitchFamily="49" charset="0"/>
+              </a:rPr>
+              <a:t>=</a:t>
+            </a:r>
+            <a:r>
+              <a:rPr lang="en-GB" sz="1600" b="0" dirty="0">
+                <a:solidFill>
+                  <a:srgbClr val="CCCCCC"/>
+                </a:solidFill>
+                <a:effectLst/>
+                <a:latin typeface="Menlo" panose="020B0609030804020204" pitchFamily="49" charset="0"/>
+              </a:rPr>
+              <a:t> </a:t>
+            </a:r>
+            <a:r>
+              <a:rPr lang="en-GB" sz="1600" b="0" dirty="0" err="1">
+                <a:solidFill>
+                  <a:srgbClr val="4EC9B0"/>
+                </a:solidFill>
+                <a:effectLst/>
+                <a:latin typeface="Menlo" panose="020B0609030804020204" pitchFamily="49" charset="0"/>
+              </a:rPr>
+              <a:t>RandomForestClassifier</a:t>
+            </a:r>
+            <a:r>
+              <a:rPr lang="en-GB" sz="1600" b="0" dirty="0">
+                <a:solidFill>
+                  <a:srgbClr val="CCCCCC"/>
+                </a:solidFill>
+                <a:effectLst/>
+                <a:latin typeface="Menlo" panose="020B0609030804020204" pitchFamily="49" charset="0"/>
+              </a:rPr>
+              <a:t>(</a:t>
+            </a:r>
+            <a:r>
+              <a:rPr lang="en-GB" sz="1600" b="0" dirty="0" err="1">
+                <a:solidFill>
+                  <a:srgbClr val="9CDCFE"/>
+                </a:solidFill>
+                <a:effectLst/>
+                <a:latin typeface="Menlo" panose="020B0609030804020204" pitchFamily="49" charset="0"/>
+              </a:rPr>
+              <a:t>n_estimators</a:t>
+            </a:r>
+            <a:r>
+              <a:rPr lang="en-GB" sz="1600" b="0" dirty="0">
+                <a:solidFill>
+                  <a:srgbClr val="D4D4D4"/>
+                </a:solidFill>
+                <a:effectLst/>
+                <a:latin typeface="Menlo" panose="020B0609030804020204" pitchFamily="49" charset="0"/>
+              </a:rPr>
+              <a:t>=</a:t>
+            </a:r>
+            <a:r>
+              <a:rPr lang="en-GB" sz="1600" b="0" dirty="0">
+                <a:solidFill>
+                  <a:srgbClr val="B5CEA8"/>
+                </a:solidFill>
+                <a:effectLst/>
+                <a:latin typeface="Menlo" panose="020B0609030804020204" pitchFamily="49" charset="0"/>
+              </a:rPr>
+              <a:t>200</a:t>
+            </a:r>
+            <a:r>
+              <a:rPr lang="en-GB" sz="1600" b="0" dirty="0">
+                <a:solidFill>
+                  <a:srgbClr val="CCCCCC"/>
+                </a:solidFill>
+                <a:effectLst/>
+                <a:latin typeface="Menlo" panose="020B0609030804020204" pitchFamily="49" charset="0"/>
+              </a:rPr>
+              <a:t>, </a:t>
+            </a:r>
+            <a:r>
+              <a:rPr lang="en-GB" sz="1600" b="0" dirty="0" err="1">
+                <a:solidFill>
+                  <a:srgbClr val="9CDCFE"/>
+                </a:solidFill>
+                <a:effectLst/>
+                <a:latin typeface="Menlo" panose="020B0609030804020204" pitchFamily="49" charset="0"/>
+              </a:rPr>
+              <a:t>max_depth</a:t>
+            </a:r>
+            <a:r>
+              <a:rPr lang="en-GB" sz="1600" b="0" dirty="0">
+                <a:solidFill>
+                  <a:srgbClr val="D4D4D4"/>
+                </a:solidFill>
+                <a:effectLst/>
+                <a:latin typeface="Menlo" panose="020B0609030804020204" pitchFamily="49" charset="0"/>
+              </a:rPr>
+              <a:t>=</a:t>
+            </a:r>
+            <a:r>
+              <a:rPr lang="en-GB" sz="1600" b="0" dirty="0">
+                <a:solidFill>
+                  <a:srgbClr val="B5CEA8"/>
+                </a:solidFill>
+                <a:effectLst/>
+                <a:latin typeface="Menlo" panose="020B0609030804020204" pitchFamily="49" charset="0"/>
+              </a:rPr>
+              <a:t>10</a:t>
+            </a:r>
+            <a:r>
+              <a:rPr lang="en-GB" sz="1600" b="0" dirty="0">
+                <a:solidFill>
+                  <a:srgbClr val="CCCCCC"/>
+                </a:solidFill>
+                <a:effectLst/>
+                <a:latin typeface="Menlo" panose="020B0609030804020204" pitchFamily="49" charset="0"/>
+              </a:rPr>
+              <a:t>, </a:t>
+            </a:r>
+            <a:r>
+              <a:rPr lang="en-GB" sz="1600" b="0" dirty="0" err="1">
+                <a:solidFill>
+                  <a:srgbClr val="9CDCFE"/>
+                </a:solidFill>
+                <a:effectLst/>
+                <a:latin typeface="Menlo" panose="020B0609030804020204" pitchFamily="49" charset="0"/>
+              </a:rPr>
+              <a:t>max_features</a:t>
+            </a:r>
+            <a:r>
+              <a:rPr lang="en-GB" sz="1600" b="0" dirty="0">
+                <a:solidFill>
+                  <a:srgbClr val="D4D4D4"/>
+                </a:solidFill>
+                <a:effectLst/>
+                <a:latin typeface="Menlo" panose="020B0609030804020204" pitchFamily="49" charset="0"/>
+              </a:rPr>
+              <a:t>=</a:t>
+            </a:r>
+            <a:r>
+              <a:rPr lang="en-GB" sz="1600" b="0" dirty="0">
+                <a:solidFill>
+                  <a:srgbClr val="CE9178"/>
+                </a:solidFill>
+                <a:effectLst/>
+                <a:latin typeface="Menlo" panose="020B0609030804020204" pitchFamily="49" charset="0"/>
+              </a:rPr>
+              <a:t>"log2"</a:t>
+            </a:r>
+            <a:r>
+              <a:rPr lang="en-GB" sz="1600" b="0" dirty="0">
+                <a:solidFill>
+                  <a:srgbClr val="CCCCCC"/>
+                </a:solidFill>
+                <a:effectLst/>
+                <a:latin typeface="Menlo" panose="020B0609030804020204" pitchFamily="49" charset="0"/>
+              </a:rPr>
+              <a:t>)</a:t>
+            </a:r>
+          </a:p>
+          <a:p>
+            <a:endParaRPr lang="en-RS" dirty="0"/>
+          </a:p>
+        </p:txBody>
+      </p:sp>
+    </p:spTree>
+    <p:extLst>
+      <p:ext uri="{BB962C8B-B14F-4D97-AF65-F5344CB8AC3E}">
+        <p14:creationId xmlns:p14="http://schemas.microsoft.com/office/powerpoint/2010/main" val="3851834919"/>
+      </p:ext>
+    </p:extLst>
+  </p:cSld>
+  <p:clrMapOvr>
+    <a:masterClrMapping/>
+  </p:clrMapOvr>
+</p:sld>
+</file>
+
+<file path=ppt/slides/slide12.xml><?xml version="1.0" encoding="utf-8"?>
+<p:sld xmlns:a="http://schemas.openxmlformats.org/drawingml/2006/main" xmlns:r="http://schemas.openxmlformats.org/officeDocument/2006/relationships" xmlns:p="http://schemas.openxmlformats.org/presentationml/2006/main">
+  <p:cSld>
+    <p:spTree>
+      <p:nvGrpSpPr>
+        <p:cNvPr id="1" name=""/>
+        <p:cNvGrpSpPr/>
+        <p:nvPr/>
+      </p:nvGrpSpPr>
+      <p:grpSpPr>
+        <a:xfrm>
+          <a:off x="0" y="0"/>
+          <a:ext cx="0" cy="0"/>
+          <a:chOff x="0" y="0"/>
+          <a:chExt cx="0" cy="0"/>
+        </a:xfrm>
+      </p:grpSpPr>
+      <p:sp>
+        <p:nvSpPr>
+          <p:cNvPr id="2" name="Title 1">
+            <a:extLst>
+              <a:ext uri="{FF2B5EF4-FFF2-40B4-BE49-F238E27FC236}">
+                <a16:creationId xmlns:a16="http://schemas.microsoft.com/office/drawing/2014/main" id="{5F6D0E94-E31B-5164-459E-01BA9EC5F139}"/>
+              </a:ext>
+            </a:extLst>
+          </p:cNvPr>
+          <p:cNvSpPr>
+            <a:spLocks noGrp="1"/>
+          </p:cNvSpPr>
+          <p:nvPr>
+            <p:ph type="title"/>
+          </p:nvPr>
+        </p:nvSpPr>
+        <p:spPr/>
+        <p:txBody>
+          <a:bodyPr/>
+          <a:lstStyle/>
+          <a:p>
+            <a:r>
+              <a:rPr lang="en-RS" dirty="0"/>
+              <a:t>BRAIN EMBRYO</a:t>
+            </a:r>
+          </a:p>
+        </p:txBody>
+      </p:sp>
+      <p:pic>
+        <p:nvPicPr>
+          <p:cNvPr id="4" name="Picture 3" descr="A black background with white numbers&#10;&#10;Description automatically generated">
+            <a:extLst>
+              <a:ext uri="{FF2B5EF4-FFF2-40B4-BE49-F238E27FC236}">
+                <a16:creationId xmlns:a16="http://schemas.microsoft.com/office/drawing/2014/main" id="{05D9D0C9-3377-0CAD-4F39-9D4AFE8EC7E8}"/>
+              </a:ext>
+            </a:extLst>
+          </p:cNvPr>
+          <p:cNvPicPr>
+            <a:picLocks noChangeAspect="1"/>
+          </p:cNvPicPr>
+          <p:nvPr/>
+        </p:nvPicPr>
+        <p:blipFill>
+          <a:blip r:embed="rId2"/>
+          <a:stretch>
+            <a:fillRect/>
+          </a:stretch>
+        </p:blipFill>
+        <p:spPr>
+          <a:xfrm>
+            <a:off x="5002731" y="4710702"/>
+            <a:ext cx="5993688" cy="1456267"/>
+          </a:xfrm>
+          <a:prstGeom prst="rect">
+            <a:avLst/>
+          </a:prstGeom>
+        </p:spPr>
+      </p:pic>
+      <p:pic>
+        <p:nvPicPr>
+          <p:cNvPr id="6" name="Picture 5" descr="A black background with white numbers&#10;&#10;Description automatically generated">
+            <a:extLst>
+              <a:ext uri="{FF2B5EF4-FFF2-40B4-BE49-F238E27FC236}">
+                <a16:creationId xmlns:a16="http://schemas.microsoft.com/office/drawing/2014/main" id="{937692CE-15E1-F1B1-4D9C-3BE9E740E045}"/>
+              </a:ext>
+            </a:extLst>
+          </p:cNvPr>
+          <p:cNvPicPr>
+            <a:picLocks noChangeAspect="1"/>
+          </p:cNvPicPr>
+          <p:nvPr/>
+        </p:nvPicPr>
+        <p:blipFill>
+          <a:blip r:embed="rId3"/>
+          <a:stretch>
+            <a:fillRect/>
+          </a:stretch>
+        </p:blipFill>
+        <p:spPr>
+          <a:xfrm>
+            <a:off x="685801" y="2853889"/>
+            <a:ext cx="5855726" cy="1456267"/>
+          </a:xfrm>
+          <a:prstGeom prst="rect">
+            <a:avLst/>
+          </a:prstGeom>
+        </p:spPr>
+      </p:pic>
+      <p:pic>
+        <p:nvPicPr>
+          <p:cNvPr id="8" name="Picture 7" descr="A black background with white numbers&#10;&#10;Description automatically generated">
+            <a:extLst>
+              <a:ext uri="{FF2B5EF4-FFF2-40B4-BE49-F238E27FC236}">
+                <a16:creationId xmlns:a16="http://schemas.microsoft.com/office/drawing/2014/main" id="{4A127F3B-03C2-74E0-CC85-AEA136FF0950}"/>
+              </a:ext>
+            </a:extLst>
+          </p:cNvPr>
+          <p:cNvPicPr>
+            <a:picLocks noChangeAspect="1"/>
+          </p:cNvPicPr>
+          <p:nvPr/>
+        </p:nvPicPr>
+        <p:blipFill>
+          <a:blip r:embed="rId4"/>
+          <a:stretch>
+            <a:fillRect/>
+          </a:stretch>
+        </p:blipFill>
+        <p:spPr>
+          <a:xfrm>
+            <a:off x="5002731" y="997076"/>
+            <a:ext cx="5885746" cy="1456267"/>
+          </a:xfrm>
+          <a:prstGeom prst="rect">
+            <a:avLst/>
+          </a:prstGeom>
+        </p:spPr>
+      </p:pic>
+    </p:spTree>
+    <p:extLst>
+      <p:ext uri="{BB962C8B-B14F-4D97-AF65-F5344CB8AC3E}">
+        <p14:creationId xmlns:p14="http://schemas.microsoft.com/office/powerpoint/2010/main" val="3848768058"/>
+      </p:ext>
+    </p:extLst>
+  </p:cSld>
+  <p:clrMapOvr>
+    <a:masterClrMapping/>
+  </p:clrMapOvr>
+</p:sld>
+</file>
+
+<file path=ppt/slides/slide13.xml><?xml version="1.0" encoding="utf-8"?>
+<p:sld xmlns:a="http://schemas.openxmlformats.org/drawingml/2006/main" xmlns:r="http://schemas.openxmlformats.org/officeDocument/2006/relationships" xmlns:p="http://schemas.openxmlformats.org/presentationml/2006/main">
+  <p:cSld>
+    <p:spTree>
+      <p:nvGrpSpPr>
+        <p:cNvPr id="1" name=""/>
+        <p:cNvGrpSpPr/>
+        <p:nvPr/>
+      </p:nvGrpSpPr>
+      <p:grpSpPr>
+        <a:xfrm>
+          <a:off x="0" y="0"/>
+          <a:ext cx="0" cy="0"/>
+          <a:chOff x="0" y="0"/>
+          <a:chExt cx="0" cy="0"/>
+        </a:xfrm>
+      </p:grpSpPr>
+      <p:sp>
+        <p:nvSpPr>
+          <p:cNvPr id="2" name="Title 1">
+            <a:extLst>
+              <a:ext uri="{FF2B5EF4-FFF2-40B4-BE49-F238E27FC236}">
+                <a16:creationId xmlns:a16="http://schemas.microsoft.com/office/drawing/2014/main" id="{D0698D56-AB6C-B362-CA25-ABB6F408E81B}"/>
+              </a:ext>
+            </a:extLst>
+          </p:cNvPr>
+          <p:cNvSpPr>
+            <a:spLocks noGrp="1"/>
+          </p:cNvSpPr>
+          <p:nvPr>
+            <p:ph type="title"/>
+          </p:nvPr>
+        </p:nvSpPr>
+        <p:spPr>
+          <a:xfrm>
+            <a:off x="473365" y="2327563"/>
+            <a:ext cx="3430731" cy="1456267"/>
+          </a:xfrm>
+        </p:spPr>
+        <p:txBody>
+          <a:bodyPr/>
+          <a:lstStyle/>
+          <a:p>
+            <a:r>
+              <a:rPr lang="en-RS" dirty="0"/>
+              <a:t>BRAIN EMBRYO</a:t>
+            </a:r>
+          </a:p>
+        </p:txBody>
+      </p:sp>
+      <p:pic>
+        <p:nvPicPr>
+          <p:cNvPr id="4" name="Picture 3" descr="A diagram of a brain tissue&#10;&#10;Description automatically generated with medium confidence">
+            <a:extLst>
+              <a:ext uri="{FF2B5EF4-FFF2-40B4-BE49-F238E27FC236}">
+                <a16:creationId xmlns:a16="http://schemas.microsoft.com/office/drawing/2014/main" id="{37766EF4-E9E0-F8CE-11F4-8F2D252B6AED}"/>
+              </a:ext>
+            </a:extLst>
+          </p:cNvPr>
+          <p:cNvPicPr>
+            <a:picLocks noChangeAspect="1"/>
+          </p:cNvPicPr>
+          <p:nvPr/>
+        </p:nvPicPr>
+        <p:blipFill>
+          <a:blip r:embed="rId2"/>
+          <a:stretch>
+            <a:fillRect/>
+          </a:stretch>
+        </p:blipFill>
+        <p:spPr>
+          <a:xfrm>
+            <a:off x="3813361" y="1013560"/>
+            <a:ext cx="7772400" cy="4830880"/>
+          </a:xfrm>
+          <a:prstGeom prst="rect">
+            <a:avLst/>
+          </a:prstGeom>
+        </p:spPr>
+      </p:pic>
+      <p:pic>
+        <p:nvPicPr>
+          <p:cNvPr id="8" name="Picture 7" descr="A close-up of a brain&#10;&#10;Description automatically generated">
+            <a:extLst>
+              <a:ext uri="{FF2B5EF4-FFF2-40B4-BE49-F238E27FC236}">
+                <a16:creationId xmlns:a16="http://schemas.microsoft.com/office/drawing/2014/main" id="{854E5ED5-BD9F-011C-36EC-3ABF737AAF10}"/>
+              </a:ext>
+            </a:extLst>
+          </p:cNvPr>
+          <p:cNvPicPr>
+            <a:picLocks noChangeAspect="1"/>
+          </p:cNvPicPr>
+          <p:nvPr/>
+        </p:nvPicPr>
+        <p:blipFill>
+          <a:blip r:embed="rId3"/>
+          <a:stretch>
+            <a:fillRect/>
+          </a:stretch>
+        </p:blipFill>
+        <p:spPr>
+          <a:xfrm>
+            <a:off x="3813361" y="1013560"/>
+            <a:ext cx="7772400" cy="4863431"/>
+          </a:xfrm>
+          <a:prstGeom prst="rect">
+            <a:avLst/>
+          </a:prstGeom>
+        </p:spPr>
+      </p:pic>
+      <p:pic>
+        <p:nvPicPr>
+          <p:cNvPr id="12" name="Picture 11" descr="A diagram of a brain&#10;&#10;Description automatically generated">
+            <a:extLst>
+              <a:ext uri="{FF2B5EF4-FFF2-40B4-BE49-F238E27FC236}">
+                <a16:creationId xmlns:a16="http://schemas.microsoft.com/office/drawing/2014/main" id="{C5AFEA88-13DD-E5B8-D8E8-CF7845579644}"/>
+              </a:ext>
+            </a:extLst>
+          </p:cNvPr>
+          <p:cNvPicPr>
+            <a:picLocks noChangeAspect="1"/>
+          </p:cNvPicPr>
+          <p:nvPr/>
+        </p:nvPicPr>
+        <p:blipFill>
+          <a:blip r:embed="rId4"/>
+          <a:stretch>
+            <a:fillRect/>
+          </a:stretch>
+        </p:blipFill>
+        <p:spPr>
+          <a:xfrm>
+            <a:off x="3813361" y="1006518"/>
+            <a:ext cx="7772400" cy="4837922"/>
+          </a:xfrm>
+          <a:prstGeom prst="rect">
+            <a:avLst/>
+          </a:prstGeom>
+        </p:spPr>
+      </p:pic>
+      <p:pic>
+        <p:nvPicPr>
+          <p:cNvPr id="14" name="Picture 13" descr="A diagram of a brain&#10;&#10;Description automatically generated">
+            <a:extLst>
+              <a:ext uri="{FF2B5EF4-FFF2-40B4-BE49-F238E27FC236}">
+                <a16:creationId xmlns:a16="http://schemas.microsoft.com/office/drawing/2014/main" id="{CC450929-04E5-CFD7-2CA8-854B46578605}"/>
+              </a:ext>
+            </a:extLst>
+          </p:cNvPr>
+          <p:cNvPicPr>
+            <a:picLocks noChangeAspect="1"/>
+          </p:cNvPicPr>
+          <p:nvPr/>
+        </p:nvPicPr>
+        <p:blipFill>
+          <a:blip r:embed="rId5"/>
+          <a:stretch>
+            <a:fillRect/>
+          </a:stretch>
+        </p:blipFill>
+        <p:spPr>
+          <a:xfrm>
+            <a:off x="3813361" y="1036220"/>
+            <a:ext cx="7772400" cy="4815262"/>
+          </a:xfrm>
+          <a:prstGeom prst="rect">
+            <a:avLst/>
+          </a:prstGeom>
+        </p:spPr>
+      </p:pic>
+    </p:spTree>
+    <p:extLst>
+      <p:ext uri="{BB962C8B-B14F-4D97-AF65-F5344CB8AC3E}">
+        <p14:creationId xmlns:p14="http://schemas.microsoft.com/office/powerpoint/2010/main" val="350654350"/>
+      </p:ext>
+    </p:extLst>
+  </p:cSld>
+  <p:clrMapOvr>
+    <a:masterClrMapping/>
+  </p:clrMapOvr>
+  <p:timing>
+    <p:tnLst>
+      <p:par>
+        <p:cTn id="1" dur="indefinite" restart="never" nodeType="tmRoot">
+          <p:childTnLst>
+            <p:seq concurrent="1" nextAc="seek">
+              <p:cTn id="2" dur="indefinite" nodeType="mainSeq">
+                <p:childTnLst>
+                  <p:par>
+                    <p:cTn id="3" fill="hold">
+                      <p:stCondLst>
+                        <p:cond delay="indefinite"/>
+                      </p:stCondLst>
+                      <p:childTnLst>
+                        <p:par>
+                          <p:cTn id="4" fill="hold">
+                            <p:stCondLst>
+                              <p:cond delay="0"/>
+                            </p:stCondLst>
+                            <p:childTnLst>
+                              <p:par>
+                                <p:cTn id="5" presetID="2" presetClass="entr" presetSubtype="4" fill="hold" nodeType="clickEffect">
+                                  <p:stCondLst>
+                                    <p:cond delay="0"/>
+                                  </p:stCondLst>
+                                  <p:childTnLst>
+                                    <p:set>
+                                      <p:cBhvr>
+                                        <p:cTn id="6" dur="1" fill="hold">
+                                          <p:stCondLst>
+                                            <p:cond delay="0"/>
+                                          </p:stCondLst>
+                                        </p:cTn>
+                                        <p:tgtEl>
+                                          <p:spTgt spid="4"/>
+                                        </p:tgtEl>
+                                        <p:attrNameLst>
+                                          <p:attrName>style.visibility</p:attrName>
+                                        </p:attrNameLst>
+                                      </p:cBhvr>
+                                      <p:to>
+                                        <p:strVal val="visible"/>
+                                      </p:to>
+                                    </p:set>
+                                    <p:anim calcmode="lin" valueType="num">
+                                      <p:cBhvr additive="base">
+                                        <p:cTn id="7" dur="500" fill="hold"/>
+                                        <p:tgtEl>
+                                          <p:spTgt spid="4"/>
+                                        </p:tgtEl>
+                                        <p:attrNameLst>
+                                          <p:attrName>ppt_x</p:attrName>
+                                        </p:attrNameLst>
+                                      </p:cBhvr>
+                                      <p:tavLst>
+                                        <p:tav tm="0">
+                                          <p:val>
+                                            <p:strVal val="#ppt_x"/>
+                                          </p:val>
+                                        </p:tav>
+                                        <p:tav tm="100000">
+                                          <p:val>
+                                            <p:strVal val="#ppt_x"/>
+                                          </p:val>
+                                        </p:tav>
+                                      </p:tavLst>
+                                    </p:anim>
+                                    <p:anim calcmode="lin" valueType="num">
+                                      <p:cBhvr additive="base">
+                                        <p:cTn id="8" dur="500" fill="hold"/>
+                                        <p:tgtEl>
+                                          <p:spTgt spid="4"/>
+                                        </p:tgtEl>
+                                        <p:attrNameLst>
+                                          <p:attrName>ppt_y</p:attrName>
+                                        </p:attrNameLst>
+                                      </p:cBhvr>
+                                      <p:tavLst>
+                                        <p:tav tm="0">
+                                          <p:val>
+                                            <p:strVal val="1+#ppt_h/2"/>
+                                          </p:val>
+                                        </p:tav>
+                                        <p:tav tm="100000">
+                                          <p:val>
+                                            <p:strVal val="#ppt_y"/>
+                                          </p:val>
+                                        </p:tav>
+                                      </p:tavLst>
+                                    </p:anim>
+                                  </p:childTnLst>
+                                </p:cTn>
+                              </p:par>
+                            </p:childTnLst>
+                          </p:cTn>
+                        </p:par>
+                      </p:childTnLst>
+                    </p:cTn>
+                  </p:par>
+                  <p:par>
+                    <p:cTn id="9" fill="hold">
+                      <p:stCondLst>
+                        <p:cond delay="indefinite"/>
+                      </p:stCondLst>
+                      <p:childTnLst>
+                        <p:par>
+                          <p:cTn id="10" fill="hold">
+                            <p:stCondLst>
+                              <p:cond delay="0"/>
+                            </p:stCondLst>
+                            <p:childTnLst>
+                              <p:par>
+                                <p:cTn id="11" presetID="2" presetClass="entr" presetSubtype="4" fill="hold" nodeType="clickEffect">
+                                  <p:stCondLst>
+                                    <p:cond delay="0"/>
+                                  </p:stCondLst>
+                                  <p:childTnLst>
+                                    <p:set>
+                                      <p:cBhvr>
+                                        <p:cTn id="12" dur="1" fill="hold">
+                                          <p:stCondLst>
+                                            <p:cond delay="0"/>
+                                          </p:stCondLst>
+                                        </p:cTn>
+                                        <p:tgtEl>
+                                          <p:spTgt spid="8"/>
+                                        </p:tgtEl>
+                                        <p:attrNameLst>
+                                          <p:attrName>style.visibility</p:attrName>
+                                        </p:attrNameLst>
+                                      </p:cBhvr>
+                                      <p:to>
+                                        <p:strVal val="visible"/>
+                                      </p:to>
+                                    </p:set>
+                                    <p:anim calcmode="lin" valueType="num">
+                                      <p:cBhvr additive="base">
+                                        <p:cTn id="13" dur="500" fill="hold"/>
+                                        <p:tgtEl>
+                                          <p:spTgt spid="8"/>
+                                        </p:tgtEl>
+                                        <p:attrNameLst>
+                                          <p:attrName>ppt_x</p:attrName>
+                                        </p:attrNameLst>
+                                      </p:cBhvr>
+                                      <p:tavLst>
+                                        <p:tav tm="0">
+                                          <p:val>
+                                            <p:strVal val="#ppt_x"/>
+                                          </p:val>
+                                        </p:tav>
+                                        <p:tav tm="100000">
+                                          <p:val>
+                                            <p:strVal val="#ppt_x"/>
+                                          </p:val>
+                                        </p:tav>
+                                      </p:tavLst>
+                                    </p:anim>
+                                    <p:anim calcmode="lin" valueType="num">
+                                      <p:cBhvr additive="base">
+                                        <p:cTn id="14" dur="500" fill="hold"/>
+                                        <p:tgtEl>
+                                          <p:spTgt spid="8"/>
+                                        </p:tgtEl>
+                                        <p:attrNameLst>
+                                          <p:attrName>ppt_y</p:attrName>
+                                        </p:attrNameLst>
+                                      </p:cBhvr>
+                                      <p:tavLst>
+                                        <p:tav tm="0">
+                                          <p:val>
+                                            <p:strVal val="1+#ppt_h/2"/>
+                                          </p:val>
+                                        </p:tav>
+                                        <p:tav tm="100000">
+                                          <p:val>
+                                            <p:strVal val="#ppt_y"/>
+                                          </p:val>
+                                        </p:tav>
+                                      </p:tavLst>
+                                    </p:anim>
+                                  </p:childTnLst>
+                                </p:cTn>
+                              </p:par>
+                            </p:childTnLst>
+                          </p:cTn>
+                        </p:par>
+                      </p:childTnLst>
+                    </p:cTn>
+                  </p:par>
+                  <p:par>
+                    <p:cTn id="15" fill="hold">
+                      <p:stCondLst>
+                        <p:cond delay="indefinite"/>
+                      </p:stCondLst>
+                      <p:childTnLst>
+                        <p:par>
+                          <p:cTn id="16" fill="hold">
+                            <p:stCondLst>
+                              <p:cond delay="0"/>
+                            </p:stCondLst>
+                            <p:childTnLst>
+                              <p:par>
+                                <p:cTn id="17" presetID="2" presetClass="entr" presetSubtype="4" fill="hold" nodeType="clickEffect">
+                                  <p:stCondLst>
+                                    <p:cond delay="0"/>
+                                  </p:stCondLst>
+                                  <p:childTnLst>
+                                    <p:set>
+                                      <p:cBhvr>
+                                        <p:cTn id="18" dur="1" fill="hold">
+                                          <p:stCondLst>
+                                            <p:cond delay="0"/>
+                                          </p:stCondLst>
+                                        </p:cTn>
+                                        <p:tgtEl>
+                                          <p:spTgt spid="12"/>
+                                        </p:tgtEl>
+                                        <p:attrNameLst>
+                                          <p:attrName>style.visibility</p:attrName>
+                                        </p:attrNameLst>
+                                      </p:cBhvr>
+                                      <p:to>
+                                        <p:strVal val="visible"/>
+                                      </p:to>
+                                    </p:set>
+                                    <p:anim calcmode="lin" valueType="num">
+                                      <p:cBhvr additive="base">
+                                        <p:cTn id="19" dur="500" fill="hold"/>
+                                        <p:tgtEl>
+                                          <p:spTgt spid="12"/>
+                                        </p:tgtEl>
+                                        <p:attrNameLst>
+                                          <p:attrName>ppt_x</p:attrName>
+                                        </p:attrNameLst>
+                                      </p:cBhvr>
+                                      <p:tavLst>
+                                        <p:tav tm="0">
+                                          <p:val>
+                                            <p:strVal val="#ppt_x"/>
+                                          </p:val>
+                                        </p:tav>
+                                        <p:tav tm="100000">
+                                          <p:val>
+                                            <p:strVal val="#ppt_x"/>
+                                          </p:val>
+                                        </p:tav>
+                                      </p:tavLst>
+                                    </p:anim>
+                                    <p:anim calcmode="lin" valueType="num">
+                                      <p:cBhvr additive="base">
+                                        <p:cTn id="20" dur="500" fill="hold"/>
+                                        <p:tgtEl>
+                                          <p:spTgt spid="12"/>
+                                        </p:tgtEl>
+                                        <p:attrNameLst>
+                                          <p:attrName>ppt_y</p:attrName>
+                                        </p:attrNameLst>
+                                      </p:cBhvr>
+                                      <p:tavLst>
+                                        <p:tav tm="0">
+                                          <p:val>
+                                            <p:strVal val="1+#ppt_h/2"/>
+                                          </p:val>
+                                        </p:tav>
+                                        <p:tav tm="100000">
+                                          <p:val>
+                                            <p:strVal val="#ppt_y"/>
+                                          </p:val>
+                                        </p:tav>
+                                      </p:tavLst>
+                                    </p:anim>
+                                  </p:childTnLst>
+                                </p:cTn>
+                              </p:par>
+                            </p:childTnLst>
+                          </p:cTn>
+                        </p:par>
+                      </p:childTnLst>
+                    </p:cTn>
+                  </p:par>
+                  <p:par>
+                    <p:cTn id="21" fill="hold">
+                      <p:stCondLst>
+                        <p:cond delay="indefinite"/>
+                      </p:stCondLst>
+                      <p:childTnLst>
+                        <p:par>
+                          <p:cTn id="22" fill="hold">
+                            <p:stCondLst>
+                              <p:cond delay="0"/>
+                            </p:stCondLst>
+                            <p:childTnLst>
+                              <p:par>
+                                <p:cTn id="23" presetID="2" presetClass="entr" presetSubtype="4" fill="hold" nodeType="clickEffect">
+                                  <p:stCondLst>
+                                    <p:cond delay="0"/>
+                                  </p:stCondLst>
+                                  <p:childTnLst>
+                                    <p:set>
+                                      <p:cBhvr>
+                                        <p:cTn id="24" dur="1" fill="hold">
+                                          <p:stCondLst>
+                                            <p:cond delay="0"/>
+                                          </p:stCondLst>
+                                        </p:cTn>
+                                        <p:tgtEl>
+                                          <p:spTgt spid="14"/>
+                                        </p:tgtEl>
+                                        <p:attrNameLst>
+                                          <p:attrName>style.visibility</p:attrName>
+                                        </p:attrNameLst>
+                                      </p:cBhvr>
+                                      <p:to>
+                                        <p:strVal val="visible"/>
+                                      </p:to>
+                                    </p:set>
+                                    <p:anim calcmode="lin" valueType="num">
+                                      <p:cBhvr additive="base">
+                                        <p:cTn id="25" dur="500" fill="hold"/>
+                                        <p:tgtEl>
+                                          <p:spTgt spid="14"/>
+                                        </p:tgtEl>
+                                        <p:attrNameLst>
+                                          <p:attrName>ppt_x</p:attrName>
+                                        </p:attrNameLst>
+                                      </p:cBhvr>
+                                      <p:tavLst>
+                                        <p:tav tm="0">
+                                          <p:val>
+                                            <p:strVal val="#ppt_x"/>
+                                          </p:val>
+                                        </p:tav>
+                                        <p:tav tm="100000">
+                                          <p:val>
+                                            <p:strVal val="#ppt_x"/>
+                                          </p:val>
+                                        </p:tav>
+                                      </p:tavLst>
+                                    </p:anim>
+                                    <p:anim calcmode="lin" valueType="num">
+                                      <p:cBhvr additive="base">
+                                        <p:cTn id="26" dur="500" fill="hold"/>
+                                        <p:tgtEl>
+                                          <p:spTgt spid="14"/>
+                                        </p:tgtEl>
+                                        <p:attrNameLst>
+                                          <p:attrName>ppt_y</p:attrName>
+                                        </p:attrNameLst>
+                                      </p:cBhvr>
+                                      <p:tavLst>
+                                        <p:tav tm="0">
+                                          <p:val>
+                                            <p:strVal val="1+#ppt_h/2"/>
+                                          </p:val>
+                                        </p:tav>
+                                        <p:tav tm="100000">
+                                          <p:val>
+                                            <p:strVal val="#ppt_y"/>
+                                          </p:val>
+                                        </p:tav>
+                                      </p:tavLst>
+                                    </p:anim>
+                                  </p:childTnLst>
+                                </p:cTn>
+                              </p:par>
+                            </p:childTnLst>
+                          </p:cTn>
+                        </p:par>
+                      </p:childTnLst>
+                    </p:cTn>
+                  </p:par>
+                </p:childTnLst>
+              </p:cTn>
+              <p:prevCondLst>
+                <p:cond evt="onPrev" delay="0">
+                  <p:tgtEl>
+                    <p:sldTgt/>
+                  </p:tgtEl>
+                </p:cond>
+              </p:prevCondLst>
+              <p:nextCondLst>
+                <p:cond evt="onNext" delay="0">
+                  <p:tgtEl>
+                    <p:sldTgt/>
+                  </p:tgtEl>
+                </p:cond>
+              </p:nextCondLst>
+            </p:seq>
+          </p:childTnLst>
+        </p:cTn>
+      </p:par>
+    </p:tnLst>
+  </p:timing>
+</p:sld>
+</file>
+
+<file path=ppt/slides/slide14.xml><?xml version="1.0" encoding="utf-8"?>
+<p:sld xmlns:a="http://schemas.openxmlformats.org/drawingml/2006/main" xmlns:r="http://schemas.openxmlformats.org/officeDocument/2006/relationships" xmlns:p="http://schemas.openxmlformats.org/presentationml/2006/main">
+  <p:cSld>
+    <p:spTree>
+      <p:nvGrpSpPr>
+        <p:cNvPr id="1" name=""/>
+        <p:cNvGrpSpPr/>
+        <p:nvPr/>
+      </p:nvGrpSpPr>
+      <p:grpSpPr>
+        <a:xfrm>
+          <a:off x="0" y="0"/>
+          <a:ext cx="0" cy="0"/>
+          <a:chOff x="0" y="0"/>
+          <a:chExt cx="0" cy="0"/>
+        </a:xfrm>
+      </p:grpSpPr>
+      <p:sp>
+        <p:nvSpPr>
+          <p:cNvPr id="2" name="Title 1">
+            <a:extLst>
+              <a:ext uri="{FF2B5EF4-FFF2-40B4-BE49-F238E27FC236}">
+                <a16:creationId xmlns:a16="http://schemas.microsoft.com/office/drawing/2014/main" id="{C633DD73-2AEA-97BE-DBFF-3ECD9CA6E038}"/>
+              </a:ext>
+            </a:extLst>
+          </p:cNvPr>
+          <p:cNvSpPr>
+            <a:spLocks noGrp="1"/>
+          </p:cNvSpPr>
+          <p:nvPr>
+            <p:ph type="title"/>
+          </p:nvPr>
+        </p:nvSpPr>
+        <p:spPr>
+          <a:xfrm>
+            <a:off x="1636062" y="1972733"/>
+            <a:ext cx="8350622" cy="1456267"/>
+          </a:xfrm>
+        </p:spPr>
+        <p:txBody>
+          <a:bodyPr/>
+          <a:lstStyle/>
+          <a:p>
+            <a:pPr algn="ctr"/>
+            <a:r>
+              <a:rPr lang="en-RS" dirty="0"/>
+              <a:t>ThANK YOU FOR your ATTENTION</a:t>
+            </a:r>
           </a:p>
         </p:txBody>
       </p:sp>
@@ -5866,7 +8476,7 @@
           <p:cNvPr id="3" name="Content Placeholder 2">
             <a:extLst>
               <a:ext uri="{FF2B5EF4-FFF2-40B4-BE49-F238E27FC236}">
-                <a16:creationId xmlns:a16="http://schemas.microsoft.com/office/drawing/2014/main" id="{751117B8-BCEC-CB8D-573D-2F4BC6CFF510}"/>
+                <a16:creationId xmlns:a16="http://schemas.microsoft.com/office/drawing/2014/main" id="{5C415EDA-EEC6-B9F3-9CA2-812138BE09D2}"/>
               </a:ext>
             </a:extLst>
           </p:cNvPr>
@@ -5877,19 +8487,41 @@
             <p:ph idx="1"/>
           </p:nvPr>
         </p:nvSpPr>
-        <p:spPr/>
-        <p:txBody>
-          <a:bodyPr/>
+        <p:spPr>
+          <a:xfrm>
+            <a:off x="6669741" y="3765176"/>
+            <a:ext cx="4147485" cy="2026024"/>
+          </a:xfrm>
+        </p:spPr>
+        <p:txBody>
+          <a:bodyPr>
+            <a:normAutofit/>
+          </a:bodyPr>
           <a:lstStyle/>
           <a:p>
-            <a:endParaRPr lang="en-RS"/>
+            <a:pPr marL="0" indent="0" algn="r">
+              <a:buNone/>
+            </a:pPr>
+            <a:r>
+              <a:rPr lang="en-RS" sz="2400" dirty="0"/>
+              <a:t>Raša Stojanović</a:t>
+            </a:r>
+          </a:p>
+          <a:p>
+            <a:pPr marL="0" indent="0" algn="r">
+              <a:buNone/>
+            </a:pPr>
+            <a:r>
+              <a:rPr lang="en-RS" sz="2400" dirty="0"/>
+              <a:t>Dejan Drašković</a:t>
+            </a:r>
           </a:p>
         </p:txBody>
       </p:sp>
     </p:spTree>
     <p:extLst>
       <p:ext uri="{BB962C8B-B14F-4D97-AF65-F5344CB8AC3E}">
-        <p14:creationId xmlns:p14="http://schemas.microsoft.com/office/powerpoint/2010/main" val="3893604957"/>
+        <p14:creationId xmlns:p14="http://schemas.microsoft.com/office/powerpoint/2010/main" val="4132685362"/>
       </p:ext>
     </p:extLst>
   </p:cSld>
@@ -6551,7 +9183,7 @@
         </p:blipFill>
         <p:spPr>
           <a:xfrm>
-            <a:off x="5178222" y="609600"/>
+            <a:off x="5886442" y="936999"/>
             <a:ext cx="4863400" cy="3855135"/>
           </a:xfrm>
           <a:prstGeom prst="rect">
@@ -9019,6 +11651,15 @@
 <file path=ppt/slides/slide8.xml><?xml version="1.0" encoding="utf-8"?>
 <p:sld xmlns:a="http://schemas.openxmlformats.org/drawingml/2006/main" xmlns:r="http://schemas.openxmlformats.org/officeDocument/2006/relationships" xmlns:p="http://schemas.openxmlformats.org/presentationml/2006/main">
   <p:cSld>
+    <p:bg>
+      <p:bgPr>
+        <a:blipFill>
+          <a:blip r:embed="rId2"/>
+          <a:stretch/>
+        </a:blipFill>
+        <a:effectLst/>
+      </p:bgPr>
+    </p:bg>
     <p:spTree>
       <p:nvGrpSpPr>
         <p:cNvPr id="1" name=""/>
@@ -9038,7 +11679,7 @@
           <p:cNvPr id="2" name="Title 1">
             <a:extLst>
               <a:ext uri="{FF2B5EF4-FFF2-40B4-BE49-F238E27FC236}">
-                <a16:creationId xmlns:a16="http://schemas.microsoft.com/office/drawing/2014/main" id="{C633DD73-2AEA-97BE-DBFF-3ECD9CA6E038}"/>
+                <a16:creationId xmlns:a16="http://schemas.microsoft.com/office/drawing/2014/main" id="{881ACC84-C6EE-BAEA-2134-C4A742E00EFB}"/>
               </a:ext>
             </a:extLst>
           </p:cNvPr>
@@ -9049,12 +11690,22 @@
             <p:ph type="title"/>
           </p:nvPr>
         </p:nvSpPr>
-        <p:spPr/>
-        <p:txBody>
-          <a:bodyPr/>
+        <p:spPr>
+          <a:xfrm>
+            <a:off x="685800" y="562436"/>
+            <a:ext cx="4785744" cy="1035579"/>
+          </a:xfrm>
+        </p:spPr>
+        <p:txBody>
+          <a:bodyPr>
+            <a:normAutofit/>
+          </a:bodyPr>
           <a:lstStyle/>
           <a:p>
-            <a:endParaRPr lang="en-RS"/>
+            <a:r>
+              <a:rPr lang="en-RS" dirty="0"/>
+              <a:t>BRAIN embryo</a:t>
+            </a:r>
           </a:p>
         </p:txBody>
       </p:sp>
@@ -9063,7 +11714,7 @@
           <p:cNvPr id="3" name="Content Placeholder 2">
             <a:extLst>
               <a:ext uri="{FF2B5EF4-FFF2-40B4-BE49-F238E27FC236}">
-                <a16:creationId xmlns:a16="http://schemas.microsoft.com/office/drawing/2014/main" id="{5C415EDA-EEC6-B9F3-9CA2-812138BE09D2}"/>
+                <a16:creationId xmlns:a16="http://schemas.microsoft.com/office/drawing/2014/main" id="{B0A5CA7D-11F3-9324-0CDC-A8BA59A22A69}"/>
               </a:ext>
             </a:extLst>
           </p:cNvPr>
@@ -9074,19 +11725,125 @@
             <p:ph idx="1"/>
           </p:nvPr>
         </p:nvSpPr>
-        <p:spPr/>
-        <p:txBody>
-          <a:bodyPr/>
+        <p:spPr>
+          <a:xfrm>
+            <a:off x="605201" y="1325489"/>
+            <a:ext cx="3248637" cy="2211819"/>
+          </a:xfrm>
+        </p:spPr>
+        <p:txBody>
+          <a:bodyPr>
+            <a:normAutofit/>
+          </a:bodyPr>
           <a:lstStyle/>
           <a:p>
-            <a:endParaRPr lang="en-RS"/>
-          </a:p>
-        </p:txBody>
-      </p:sp>
+            <a:r>
+              <a:rPr lang="en-RS" sz="2400" dirty="0"/>
+              <a:t>Data load</a:t>
+            </a:r>
+          </a:p>
+          <a:p>
+            <a:r>
+              <a:rPr lang="en-RS" sz="2400" dirty="0"/>
+              <a:t>Data visualization</a:t>
+            </a:r>
+          </a:p>
+        </p:txBody>
+      </p:sp>
+      <p:pic>
+        <p:nvPicPr>
+          <p:cNvPr id="6" name="Picture 5" descr="A blue diamond shaped object with numbers&#10;&#10;Description automatically generated">
+            <a:extLst>
+              <a:ext uri="{FF2B5EF4-FFF2-40B4-BE49-F238E27FC236}">
+                <a16:creationId xmlns:a16="http://schemas.microsoft.com/office/drawing/2014/main" id="{55D4E4B4-D904-367D-0854-31A068508ABE}"/>
+              </a:ext>
+            </a:extLst>
+          </p:cNvPr>
+          <p:cNvPicPr>
+            <a:picLocks noChangeAspect="1"/>
+          </p:cNvPicPr>
+          <p:nvPr/>
+        </p:nvPicPr>
+        <p:blipFill>
+          <a:blip r:embed="rId3"/>
+          <a:stretch>
+            <a:fillRect/>
+          </a:stretch>
+        </p:blipFill>
+        <p:spPr>
+          <a:xfrm>
+            <a:off x="1712659" y="3537308"/>
+            <a:ext cx="8371962" cy="2693163"/>
+          </a:xfrm>
+          <a:prstGeom prst="rect">
+            <a:avLst/>
+          </a:prstGeom>
+        </p:spPr>
+      </p:pic>
+      <p:pic>
+        <p:nvPicPr>
+          <p:cNvPr id="10" name="Picture 9" descr="A graph showing a number of numbers&#10;&#10;Description automatically generated with medium confidence">
+            <a:extLst>
+              <a:ext uri="{FF2B5EF4-FFF2-40B4-BE49-F238E27FC236}">
+                <a16:creationId xmlns:a16="http://schemas.microsoft.com/office/drawing/2014/main" id="{33000F3C-0B4F-9DAB-FC98-C57465A5205D}"/>
+              </a:ext>
+            </a:extLst>
+          </p:cNvPr>
+          <p:cNvPicPr>
+            <a:picLocks noChangeAspect="1"/>
+          </p:cNvPicPr>
+          <p:nvPr/>
+        </p:nvPicPr>
+        <p:blipFill>
+          <a:blip r:embed="rId4"/>
+          <a:stretch>
+            <a:fillRect/>
+          </a:stretch>
+        </p:blipFill>
+        <p:spPr>
+          <a:xfrm>
+            <a:off x="4074155" y="770813"/>
+            <a:ext cx="3648971" cy="2384072"/>
+          </a:xfrm>
+          <a:prstGeom prst="rect">
+            <a:avLst/>
+          </a:prstGeom>
+        </p:spPr>
+      </p:pic>
+      <p:pic>
+        <p:nvPicPr>
+          <p:cNvPr id="12" name="Picture 11" descr="A graph showing a curve&#10;&#10;Description automatically generated">
+            <a:extLst>
+              <a:ext uri="{FF2B5EF4-FFF2-40B4-BE49-F238E27FC236}">
+                <a16:creationId xmlns:a16="http://schemas.microsoft.com/office/drawing/2014/main" id="{3A94F5EF-E2F4-F0C3-16D0-801D3127B2B0}"/>
+              </a:ext>
+            </a:extLst>
+          </p:cNvPr>
+          <p:cNvPicPr>
+            <a:picLocks noChangeAspect="1"/>
+          </p:cNvPicPr>
+          <p:nvPr/>
+        </p:nvPicPr>
+        <p:blipFill>
+          <a:blip r:embed="rId5"/>
+          <a:stretch>
+            <a:fillRect/>
+          </a:stretch>
+        </p:blipFill>
+        <p:spPr>
+          <a:xfrm>
+            <a:off x="7988148" y="770813"/>
+            <a:ext cx="3728065" cy="2389935"/>
+          </a:xfrm>
+          <a:prstGeom prst="rect">
+            <a:avLst/>
+          </a:prstGeom>
+        </p:spPr>
+      </p:pic>
     </p:spTree>
     <p:extLst>
       <p:ext uri="{BB962C8B-B14F-4D97-AF65-F5344CB8AC3E}">
-        <p14:creationId xmlns:p14="http://schemas.microsoft.com/office/powerpoint/2010/main" val="4132685362"/>
+        <p14:creationId xmlns:p14="http://schemas.microsoft.com/office/powerpoint/2010/main" val="539468327"/>
       </p:ext>
     </p:extLst>
   </p:cSld>
@@ -9118,7 +11875,7 @@
           <p:cNvPr id="2" name="Title 1">
             <a:extLst>
               <a:ext uri="{FF2B5EF4-FFF2-40B4-BE49-F238E27FC236}">
-                <a16:creationId xmlns:a16="http://schemas.microsoft.com/office/drawing/2014/main" id="{3D8EBD3F-D22D-5979-F3C9-9FACD02CEB31}"/>
+                <a16:creationId xmlns:a16="http://schemas.microsoft.com/office/drawing/2014/main" id="{1FBD719A-024E-3A38-D178-062CA8BF4766}"/>
               </a:ext>
             </a:extLst>
           </p:cNvPr>
@@ -9134,7 +11891,10 @@
           <a:bodyPr/>
           <a:lstStyle/>
           <a:p>
-            <a:endParaRPr lang="en-RS"/>
+            <a:r>
+              <a:rPr lang="en-RS" dirty="0"/>
+              <a:t>BRAIN EMBRYO</a:t>
+            </a:r>
           </a:p>
         </p:txBody>
       </p:sp>
@@ -9143,7 +11903,7 @@
           <p:cNvPr id="3" name="Content Placeholder 2">
             <a:extLst>
               <a:ext uri="{FF2B5EF4-FFF2-40B4-BE49-F238E27FC236}">
-                <a16:creationId xmlns:a16="http://schemas.microsoft.com/office/drawing/2014/main" id="{8729CCA1-D67D-B8B4-8272-1C7CECB14B73}"/>
+                <a16:creationId xmlns:a16="http://schemas.microsoft.com/office/drawing/2014/main" id="{E33E4523-31C4-90B0-D697-FE16982E7B62}"/>
               </a:ext>
             </a:extLst>
           </p:cNvPr>
@@ -9154,19 +11914,241 @@
             <p:ph idx="1"/>
           </p:nvPr>
         </p:nvSpPr>
-        <p:spPr/>
+        <p:spPr>
+          <a:xfrm>
+            <a:off x="543189" y="2273379"/>
+            <a:ext cx="5485700" cy="2518755"/>
+          </a:xfrm>
+        </p:spPr>
         <p:txBody>
           <a:bodyPr/>
           <a:lstStyle/>
           <a:p>
-            <a:endParaRPr lang="en-RS"/>
+            <a:r>
+              <a:rPr lang="en-RS" sz="2400" dirty="0"/>
+              <a:t>Data filtering : </a:t>
+            </a:r>
+          </a:p>
+          <a:p>
+            <a:pPr lvl="1"/>
+            <a:r>
+              <a:rPr lang="en-GB" sz="2000" dirty="0"/>
+              <a:t>M</a:t>
+            </a:r>
+            <a:r>
+              <a:rPr lang="en-RS" sz="2000" dirty="0"/>
+              <a:t>in genes</a:t>
+            </a:r>
+          </a:p>
+          <a:p>
+            <a:pPr lvl="1"/>
+            <a:r>
+              <a:rPr lang="en-GB" sz="2000" dirty="0"/>
+              <a:t>M</a:t>
+            </a:r>
+            <a:r>
+              <a:rPr lang="en-RS" sz="2000" dirty="0"/>
+              <a:t>in cells</a:t>
+            </a:r>
+          </a:p>
+          <a:p>
+            <a:pPr lvl="1"/>
+            <a:r>
+              <a:rPr lang="en-GB" sz="2000" dirty="0"/>
+              <a:t>M</a:t>
+            </a:r>
+            <a:r>
+              <a:rPr lang="en-RS" sz="2000" dirty="0"/>
+              <a:t>ax </a:t>
+            </a:r>
+            <a:r>
+              <a:rPr lang="en-GB" sz="2000" dirty="0"/>
+              <a:t>mitochondrial genes</a:t>
+            </a:r>
+            <a:r>
+              <a:rPr lang="en-RS" sz="2000" dirty="0"/>
+              <a:t> percentage</a:t>
+            </a:r>
+          </a:p>
+          <a:p>
+            <a:pPr lvl="1"/>
+            <a:r>
+              <a:rPr lang="en-GB" sz="2000" dirty="0"/>
+              <a:t>M</a:t>
+            </a:r>
+            <a:r>
+              <a:rPr lang="en-RS" sz="2000" dirty="0"/>
+              <a:t>ax number of genes</a:t>
+            </a:r>
+          </a:p>
+        </p:txBody>
+      </p:sp>
+      <p:sp>
+        <p:nvSpPr>
+          <p:cNvPr id="4" name="TextBox 3">
+            <a:extLst>
+              <a:ext uri="{FF2B5EF4-FFF2-40B4-BE49-F238E27FC236}">
+                <a16:creationId xmlns:a16="http://schemas.microsoft.com/office/drawing/2014/main" id="{1F38FDA0-75ED-9F00-9272-72F85CC03552}"/>
+              </a:ext>
+            </a:extLst>
+          </p:cNvPr>
+          <p:cNvSpPr txBox="1"/>
+          <p:nvPr/>
+        </p:nvSpPr>
+        <p:spPr>
+          <a:xfrm>
+            <a:off x="6386119" y="1281037"/>
+            <a:ext cx="5120080" cy="1569660"/>
+          </a:xfrm>
+          <a:prstGeom prst="rect">
+            <a:avLst/>
+          </a:prstGeom>
+          <a:noFill/>
+        </p:spPr>
+        <p:txBody>
+          <a:bodyPr wrap="square" rtlCol="0">
+            <a:spAutoFit/>
+          </a:bodyPr>
+          <a:lstStyle/>
+          <a:p>
+            <a:pPr marL="342900" indent="-342900">
+              <a:buFont typeface="Arial" panose="020B0604020202020204" pitchFamily="34" charset="0"/>
+              <a:buChar char="•"/>
+            </a:pPr>
+            <a:r>
+              <a:rPr lang="en-RS" sz="2400" dirty="0"/>
+              <a:t>Data normalization</a:t>
+            </a:r>
+          </a:p>
+          <a:p>
+            <a:pPr marL="342900" indent="-342900">
+              <a:buFont typeface="Arial" panose="020B0604020202020204" pitchFamily="34" charset="0"/>
+              <a:buChar char="•"/>
+            </a:pPr>
+            <a:r>
+              <a:rPr lang="en-RS" sz="2400" dirty="0"/>
+              <a:t>Log transformation</a:t>
+            </a:r>
+          </a:p>
+          <a:p>
+            <a:pPr marL="342900" indent="-342900">
+              <a:buFont typeface="Arial" panose="020B0604020202020204" pitchFamily="34" charset="0"/>
+              <a:buChar char="•"/>
+            </a:pPr>
+            <a:r>
+              <a:rPr lang="en-RS" sz="2400" dirty="0"/>
+              <a:t>Data standardization</a:t>
+            </a:r>
+          </a:p>
+          <a:p>
+            <a:pPr marL="342900" indent="-342900">
+              <a:buFont typeface="Arial" panose="020B0604020202020204" pitchFamily="34" charset="0"/>
+              <a:buChar char="•"/>
+            </a:pPr>
+            <a:endParaRPr lang="en-RS" sz="2400" dirty="0"/>
+          </a:p>
+        </p:txBody>
+      </p:sp>
+      <p:sp>
+        <p:nvSpPr>
+          <p:cNvPr id="5" name="TextBox 4">
+            <a:extLst>
+              <a:ext uri="{FF2B5EF4-FFF2-40B4-BE49-F238E27FC236}">
+                <a16:creationId xmlns:a16="http://schemas.microsoft.com/office/drawing/2014/main" id="{BD46E795-2F95-06A1-E8A6-99FEBB24CFB4}"/>
+              </a:ext>
+            </a:extLst>
+          </p:cNvPr>
+          <p:cNvSpPr txBox="1"/>
+          <p:nvPr/>
+        </p:nvSpPr>
+        <p:spPr>
+          <a:xfrm>
+            <a:off x="6386119" y="2850697"/>
+            <a:ext cx="4568208" cy="2554545"/>
+          </a:xfrm>
+          <a:prstGeom prst="rect">
+            <a:avLst/>
+          </a:prstGeom>
+          <a:noFill/>
+        </p:spPr>
+        <p:txBody>
+          <a:bodyPr wrap="square" rtlCol="0">
+            <a:spAutoFit/>
+          </a:bodyPr>
+          <a:lstStyle/>
+          <a:p>
+            <a:pPr marL="342900" indent="-342900">
+              <a:buFont typeface="Arial" panose="020B0604020202020204" pitchFamily="34" charset="0"/>
+              <a:buChar char="•"/>
+            </a:pPr>
+            <a:r>
+              <a:rPr lang="en-RS" sz="2400" dirty="0"/>
+              <a:t>Identifying highly variable genes</a:t>
+            </a:r>
+          </a:p>
+          <a:p>
+            <a:pPr marL="342900" indent="-342900">
+              <a:buFont typeface="Arial" panose="020B0604020202020204" pitchFamily="34" charset="0"/>
+              <a:buChar char="•"/>
+            </a:pPr>
+            <a:endParaRPr lang="en-RS" sz="2400" dirty="0"/>
+          </a:p>
+          <a:p>
+            <a:pPr marL="342900" indent="-342900">
+              <a:buFont typeface="Arial" panose="020B0604020202020204" pitchFamily="34" charset="0"/>
+              <a:buChar char="•"/>
+            </a:pPr>
+            <a:r>
+              <a:rPr lang="en-RS" sz="2400" dirty="0"/>
+              <a:t>Data regression</a:t>
+            </a:r>
+          </a:p>
+          <a:p>
+            <a:pPr marL="800100" lvl="1" indent="-342900">
+              <a:buFont typeface="Arial" panose="020B0604020202020204" pitchFamily="34" charset="0"/>
+              <a:buChar char="•"/>
+            </a:pPr>
+            <a:r>
+              <a:rPr lang="en-GB" sz="2000" dirty="0"/>
+              <a:t>T</a:t>
+            </a:r>
+            <a:r>
+              <a:rPr lang="en-RS" sz="2000" dirty="0"/>
+              <a:t>otal_counts</a:t>
+            </a:r>
+          </a:p>
+          <a:p>
+            <a:pPr marL="800100" lvl="1" indent="-342900">
+              <a:buFont typeface="Arial" panose="020B0604020202020204" pitchFamily="34" charset="0"/>
+              <a:buChar char="•"/>
+            </a:pPr>
+            <a:r>
+              <a:rPr lang="en-GB" sz="2000" dirty="0"/>
+              <a:t>mitochondrial genes</a:t>
+            </a:r>
+            <a:r>
+              <a:rPr lang="en-RS" sz="2000" dirty="0"/>
+              <a:t> percentage</a:t>
+            </a:r>
+            <a:endParaRPr lang="en-RS" sz="2400" dirty="0"/>
+          </a:p>
+          <a:p>
+            <a:pPr marL="800100" lvl="1" indent="-342900">
+              <a:buFont typeface="Arial" panose="020B0604020202020204" pitchFamily="34" charset="0"/>
+              <a:buChar char="•"/>
+            </a:pPr>
+            <a:endParaRPr lang="en-RS" sz="2400" dirty="0"/>
+          </a:p>
+          <a:p>
+            <a:pPr lvl="1"/>
+            <a:endParaRPr lang="en-RS" sz="2400" dirty="0"/>
           </a:p>
         </p:txBody>
       </p:sp>
     </p:spTree>
     <p:extLst>
       <p:ext uri="{BB962C8B-B14F-4D97-AF65-F5344CB8AC3E}">
-        <p14:creationId xmlns:p14="http://schemas.microsoft.com/office/powerpoint/2010/main" val="1919888840"/>
+        <p14:creationId xmlns:p14="http://schemas.microsoft.com/office/powerpoint/2010/main" val="3345788045"/>
       </p:ext>
     </p:extLst>
   </p:cSld>

</xml_diff>